<commit_message>
slide cleanups and files. still need to link
</commit_message>
<xml_diff>
--- a/_includes/files/slides/slides_day1.pptx
+++ b/_includes/files/slides/slides_day1.pptx
@@ -27,8 +27,8 @@
     <p:sldId id="268" r:id="rId18"/>
     <p:sldId id="270" r:id="rId19"/>
     <p:sldId id="373" r:id="rId20"/>
-    <p:sldId id="345" r:id="rId21"/>
-    <p:sldId id="275" r:id="rId22"/>
+    <p:sldId id="275" r:id="rId21"/>
+    <p:sldId id="384" r:id="rId22"/>
     <p:sldId id="278" r:id="rId23"/>
     <p:sldId id="277" r:id="rId24"/>
     <p:sldId id="378" r:id="rId25"/>
@@ -264,7 +264,7 @@
           <a:p>
             <a:fld id="{F833E4A7-8C8F-0444-B05A-6DE0ED7B35B0}" type="datetimeFigureOut">
               <a:rPr lang="en-US" smtClean="0"/>
-              <a:t>5/17/18</a:t>
+              <a:t>5/19/18</a:t>
             </a:fld>
             <a:endParaRPr lang="en-US"/>
           </a:p>
@@ -1293,7 +1293,7 @@
           <a:p>
             <a:fld id="{CAF647BD-C221-1844-9ED2-A7F7759EF665}" type="datetimeFigureOut">
               <a:rPr lang="en-US" smtClean="0"/>
-              <a:t>5/17/18</a:t>
+              <a:t>5/19/18</a:t>
             </a:fld>
             <a:endParaRPr lang="en-US"/>
           </a:p>
@@ -1558,7 +1558,7 @@
           <a:p>
             <a:fld id="{CAF647BD-C221-1844-9ED2-A7F7759EF665}" type="datetimeFigureOut">
               <a:rPr lang="en-US" smtClean="0"/>
-              <a:t>5/17/18</a:t>
+              <a:t>5/19/18</a:t>
             </a:fld>
             <a:endParaRPr lang="en-US"/>
           </a:p>
@@ -1733,7 +1733,7 @@
           <a:p>
             <a:fld id="{CAF647BD-C221-1844-9ED2-A7F7759EF665}" type="datetimeFigureOut">
               <a:rPr lang="en-US" smtClean="0"/>
-              <a:t>5/17/18</a:t>
+              <a:t>5/19/18</a:t>
             </a:fld>
             <a:endParaRPr lang="en-US"/>
           </a:p>
@@ -1898,7 +1898,7 @@
           <a:p>
             <a:fld id="{CAF647BD-C221-1844-9ED2-A7F7759EF665}" type="datetimeFigureOut">
               <a:rPr lang="en-US" smtClean="0"/>
-              <a:t>5/17/18</a:t>
+              <a:t>5/19/18</a:t>
             </a:fld>
             <a:endParaRPr lang="en-US"/>
           </a:p>
@@ -2147,7 +2147,7 @@
           <a:p>
             <a:fld id="{CAF647BD-C221-1844-9ED2-A7F7759EF665}" type="datetimeFigureOut">
               <a:rPr lang="en-US" smtClean="0"/>
-              <a:t>5/17/18</a:t>
+              <a:t>5/19/18</a:t>
             </a:fld>
             <a:endParaRPr lang="en-US"/>
           </a:p>
@@ -2430,7 +2430,7 @@
           <a:p>
             <a:fld id="{CAF647BD-C221-1844-9ED2-A7F7759EF665}" type="datetimeFigureOut">
               <a:rPr lang="en-US" smtClean="0"/>
-              <a:t>5/17/18</a:t>
+              <a:t>5/19/18</a:t>
             </a:fld>
             <a:endParaRPr lang="en-US"/>
           </a:p>
@@ -2869,7 +2869,7 @@
           <a:p>
             <a:fld id="{CAF647BD-C221-1844-9ED2-A7F7759EF665}" type="datetimeFigureOut">
               <a:rPr lang="en-US" smtClean="0"/>
-              <a:t>5/17/18</a:t>
+              <a:t>5/19/18</a:t>
             </a:fld>
             <a:endParaRPr lang="en-US"/>
           </a:p>
@@ -2982,7 +2982,7 @@
           <a:p>
             <a:fld id="{CAF647BD-C221-1844-9ED2-A7F7759EF665}" type="datetimeFigureOut">
               <a:rPr lang="en-US" smtClean="0"/>
-              <a:t>5/17/18</a:t>
+              <a:t>5/19/18</a:t>
             </a:fld>
             <a:endParaRPr lang="en-US"/>
           </a:p>
@@ -3072,7 +3072,7 @@
           <a:p>
             <a:fld id="{CAF647BD-C221-1844-9ED2-A7F7759EF665}" type="datetimeFigureOut">
               <a:rPr lang="en-US" smtClean="0"/>
-              <a:t>5/17/18</a:t>
+              <a:t>5/19/18</a:t>
             </a:fld>
             <a:endParaRPr lang="en-US"/>
           </a:p>
@@ -3314,7 +3314,7 @@
           <a:p>
             <a:fld id="{CAF647BD-C221-1844-9ED2-A7F7759EF665}" type="datetimeFigureOut">
               <a:rPr lang="en-US" smtClean="0"/>
-              <a:t>5/17/18</a:t>
+              <a:t>5/19/18</a:t>
             </a:fld>
             <a:endParaRPr lang="en-US"/>
           </a:p>
@@ -3608,7 +3608,7 @@
           <a:p>
             <a:fld id="{CAF647BD-C221-1844-9ED2-A7F7759EF665}" type="datetimeFigureOut">
               <a:rPr lang="en-US" smtClean="0"/>
-              <a:t>5/17/18</a:t>
+              <a:t>5/19/18</a:t>
             </a:fld>
             <a:endParaRPr lang="en-US"/>
           </a:p>
@@ -3902,7 +3902,7 @@
           <a:p>
             <a:fld id="{CAF647BD-C221-1844-9ED2-A7F7759EF665}" type="datetimeFigureOut">
               <a:rPr lang="en-US" smtClean="0"/>
-              <a:t>5/17/18</a:t>
+              <a:t>5/19/18</a:t>
             </a:fld>
             <a:endParaRPr lang="en-US"/>
           </a:p>
@@ -4434,11 +4434,7 @@
           <a:p>
             <a:r>
               <a:rPr lang="en-US" dirty="0" smtClean="0"/>
-              <a:t>Stephanie J </a:t>
-            </a:r>
-            <a:r>
-              <a:rPr lang="en-US" dirty="0" smtClean="0"/>
-              <a:t>Spielman, </a:t>
+              <a:t>Stephanie J Spielman, </a:t>
             </a:r>
             <a:r>
               <a:rPr lang="en-US" dirty="0" err="1" smtClean="0"/>
@@ -7645,10 +7641,6 @@
               </a:rPr>
               <a:t>Open your text editor (i.e. BBEdit)</a:t>
             </a:r>
-            <a:endParaRPr lang="en-US" dirty="0" smtClean="0">
-              <a:ea typeface="Monaco" charset="0"/>
-              <a:cs typeface="Monaco" charset="0"/>
-            </a:endParaRPr>
           </a:p>
           <a:p>
             <a:pPr marL="971550" lvl="1" indent="-514350">
@@ -7692,7 +7684,6 @@
               <a:rPr lang="en-US" dirty="0" smtClean="0"/>
               <a:t>Open your browser and login to the home page</a:t>
             </a:r>
-            <a:endParaRPr lang="en-US" dirty="0" smtClean="0"/>
           </a:p>
           <a:p>
             <a:endParaRPr lang="en-US" dirty="0"/>
@@ -7789,11 +7780,7 @@
           <a:p>
             <a:r>
               <a:rPr lang="en-US" sz="2600" dirty="0" smtClean="0"/>
-              <a:t>Day One, May </a:t>
-            </a:r>
-            <a:r>
-              <a:rPr lang="en-US" sz="2600" dirty="0" smtClean="0"/>
-              <a:t>21st</a:t>
+              <a:t>Day One, May 21st</a:t>
             </a:r>
           </a:p>
           <a:p>
@@ -7811,32 +7798,15 @@
             <a:pPr marL="914400" lvl="1" indent="-457200"/>
             <a:r>
               <a:rPr lang="en-US" sz="2200" dirty="0" smtClean="0"/>
-              <a:t>Python </a:t>
-            </a:r>
+              <a:t>Python data structures, Part 1</a:t>
+            </a:r>
+          </a:p>
+          <a:p>
+            <a:pPr marL="914400" lvl="1" indent="-457200"/>
             <a:r>
               <a:rPr lang="en-US" sz="2200" dirty="0" smtClean="0"/>
-              <a:t>data </a:t>
-            </a:r>
-            <a:r>
-              <a:rPr lang="en-US" sz="2200" dirty="0" smtClean="0"/>
-              <a:t>structures, Part 1</a:t>
-            </a:r>
-          </a:p>
-          <a:p>
-            <a:pPr marL="914400" lvl="1" indent="-457200"/>
-            <a:r>
-              <a:rPr lang="en-US" sz="2200" dirty="0" smtClean="0"/>
-              <a:t>Control </a:t>
-            </a:r>
-            <a:r>
-              <a:rPr lang="en-US" sz="2200" dirty="0" smtClean="0"/>
-              <a:t>flow, Part </a:t>
-            </a:r>
-            <a:r>
-              <a:rPr lang="en-US" sz="2200" dirty="0" smtClean="0"/>
-              <a:t>1</a:t>
-            </a:r>
-            <a:endParaRPr lang="en-US" sz="2200" dirty="0" smtClean="0"/>
+              <a:t>Control flow, Part 1</a:t>
+            </a:r>
           </a:p>
           <a:p>
             <a:r>
@@ -7848,7 +7818,14 @@
             <a:pPr marL="914400" lvl="1" indent="-457200"/>
             <a:r>
               <a:rPr lang="en-US" sz="2200" dirty="0" smtClean="0"/>
-              <a:t>Control flow, Part </a:t>
+              <a:t>Control flow, Part 2</a:t>
+            </a:r>
+          </a:p>
+          <a:p>
+            <a:pPr marL="914400" lvl="1" indent="-457200"/>
+            <a:r>
+              <a:rPr lang="en-US" sz="2200" dirty="0"/>
+              <a:t>Python data structures, Part </a:t>
             </a:r>
             <a:r>
               <a:rPr lang="en-US" sz="2200" dirty="0" smtClean="0"/>
@@ -7858,22 +7835,9 @@
           <a:p>
             <a:pPr marL="914400" lvl="1" indent="-457200"/>
             <a:r>
-              <a:rPr lang="en-US" sz="2200" dirty="0"/>
-              <a:t>Python data structures, Part </a:t>
-            </a:r>
-            <a:r>
-              <a:rPr lang="en-US" sz="2200" dirty="0" smtClean="0"/>
-              <a:t>2</a:t>
-            </a:r>
-            <a:endParaRPr lang="en-US" sz="2200" dirty="0" smtClean="0"/>
-          </a:p>
-          <a:p>
-            <a:pPr marL="914400" lvl="1" indent="-457200"/>
-            <a:r>
               <a:rPr lang="en-US" sz="2200" dirty="0" smtClean="0"/>
               <a:t>Functions (possibly day 3)</a:t>
             </a:r>
-            <a:endParaRPr lang="en-US" sz="2200" dirty="0" smtClean="0"/>
           </a:p>
           <a:p>
             <a:r>
@@ -7902,11 +7866,7 @@
           <a:p>
             <a:r>
               <a:rPr lang="en-US" sz="2600" dirty="0" smtClean="0"/>
-              <a:t>Day </a:t>
-            </a:r>
-            <a:r>
-              <a:rPr lang="en-US" sz="2600" dirty="0" smtClean="0"/>
-              <a:t>Four, May 24th</a:t>
+              <a:t>Day Four, May 24th</a:t>
             </a:r>
           </a:p>
           <a:p>
@@ -7920,11 +7880,7 @@
             <a:pPr marL="914400" lvl="1" indent="-457200"/>
             <a:r>
               <a:rPr lang="en-US" sz="2200" dirty="0" smtClean="0"/>
-              <a:t>Regular </a:t>
-            </a:r>
-            <a:r>
-              <a:rPr lang="en-US" sz="2200" dirty="0" smtClean="0"/>
-              <a:t>expressions and file manipulation</a:t>
+              <a:t>Regular expressions and file manipulation</a:t>
             </a:r>
           </a:p>
           <a:p>
@@ -7937,7 +7893,6 @@
               <a:rPr lang="en-US" sz="2200" dirty="0" smtClean="0"/>
               <a:t> (time permitting)</a:t>
             </a:r>
-            <a:endParaRPr lang="en-US" sz="2200" dirty="0" smtClean="0"/>
           </a:p>
         </p:txBody>
       </p:sp>
@@ -8018,7 +7973,9 @@
           </a:xfrm>
         </p:spPr>
         <p:txBody>
-          <a:bodyPr/>
+          <a:bodyPr>
+            <a:normAutofit/>
+          </a:bodyPr>
           <a:lstStyle/>
           <a:p>
             <a:pPr marL="457200" indent="-457200">
@@ -8056,12 +8013,96 @@
               <a:t> (text files with python code)</a:t>
             </a:r>
           </a:p>
+          <a:p>
+            <a:pPr marL="457200" indent="-457200">
+              <a:buFont typeface="Arial"/>
+              <a:buChar char="•"/>
+            </a:pPr>
+            <a:endParaRPr lang="en-US" dirty="0" smtClean="0"/>
+          </a:p>
+          <a:p>
+            <a:pPr marL="457200" indent="-457200">
+              <a:buFont typeface="Arial"/>
+              <a:buChar char="•"/>
+            </a:pPr>
+            <a:r>
+              <a:rPr lang="en-US" dirty="0" smtClean="0"/>
+              <a:t>Python is an </a:t>
+            </a:r>
+            <a:r>
+              <a:rPr lang="en-US" i="1" dirty="0" smtClean="0"/>
+              <a:t>object-oriented language</a:t>
+            </a:r>
+          </a:p>
+          <a:p>
+            <a:pPr marL="914400" lvl="1" indent="-457200">
+              <a:buFont typeface="Arial"/>
+              <a:buChar char="•"/>
+            </a:pPr>
+            <a:r>
+              <a:rPr lang="en-US" dirty="0" smtClean="0"/>
+              <a:t>Each variable is an </a:t>
+            </a:r>
+            <a:r>
+              <a:rPr lang="en-US" i="1" dirty="0" smtClean="0"/>
+              <a:t>object</a:t>
+            </a:r>
+            <a:r>
+              <a:rPr lang="en-US" dirty="0" smtClean="0"/>
+              <a:t> with a </a:t>
+            </a:r>
+            <a:r>
+              <a:rPr lang="en-US" i="1" dirty="0"/>
+              <a:t>name</a:t>
+            </a:r>
+            <a:r>
+              <a:rPr lang="en-US" dirty="0"/>
+              <a:t>, </a:t>
+            </a:r>
+            <a:r>
+              <a:rPr lang="en-US" i="1" dirty="0"/>
+              <a:t>value</a:t>
+            </a:r>
+            <a:r>
+              <a:rPr lang="en-US" dirty="0"/>
+              <a:t>, and </a:t>
+            </a:r>
+            <a:r>
+              <a:rPr lang="en-US" i="1" dirty="0"/>
+              <a:t>type</a:t>
+            </a:r>
+          </a:p>
+          <a:p>
+            <a:pPr marL="914400" lvl="1" indent="-457200">
+              <a:buFont typeface="Arial"/>
+              <a:buChar char="•"/>
+            </a:pPr>
+            <a:r>
+              <a:rPr lang="en-US" dirty="0"/>
+              <a:t>The </a:t>
+            </a:r>
+            <a:r>
+              <a:rPr lang="en-US" i="1" dirty="0"/>
+              <a:t>type</a:t>
+            </a:r>
+            <a:r>
+              <a:rPr lang="en-US" dirty="0"/>
+              <a:t> determines what you can do with the variable</a:t>
+            </a:r>
+          </a:p>
+          <a:p>
+            <a:pPr marL="457200" indent="-457200">
+              <a:buFont typeface="Arial"/>
+              <a:buChar char="•"/>
+            </a:pPr>
+            <a:endParaRPr lang="en-US" dirty="0" smtClean="0"/>
+          </a:p>
         </p:txBody>
       </p:sp>
     </p:spTree>
     <p:extLst>
       <p:ext uri="{BB962C8B-B14F-4D97-AF65-F5344CB8AC3E}">
-        <p14:creationId xmlns:p14="http://schemas.microsoft.com/office/powerpoint/2010/main" val="1054779688"/>
+        <p14:creationId xmlns:p14="http://schemas.microsoft.com/office/powerpoint/2010/main" val="1035205068"/>
       </p:ext>
     </p:extLst>
   </p:cSld>
@@ -8071,7 +8112,221 @@
   <p:timing>
     <p:tnLst>
       <p:par>
-        <p:cTn id="1" dur="indefinite" restart="never" nodeType="tmRoot"/>
+        <p:cTn id="1" dur="indefinite" restart="never" nodeType="tmRoot">
+          <p:childTnLst>
+            <p:seq concurrent="1" nextAc="seek">
+              <p:cTn id="2" dur="indefinite" nodeType="mainSeq">
+                <p:childTnLst>
+                  <p:par>
+                    <p:cTn id="3" fill="hold">
+                      <p:stCondLst>
+                        <p:cond delay="indefinite"/>
+                      </p:stCondLst>
+                      <p:childTnLst>
+                        <p:par>
+                          <p:cTn id="4" fill="hold">
+                            <p:stCondLst>
+                              <p:cond delay="0"/>
+                            </p:stCondLst>
+                            <p:childTnLst>
+                              <p:par>
+                                <p:cTn id="5" presetID="1" presetClass="entr" presetSubtype="0" fill="hold" nodeType="clickEffect">
+                                  <p:stCondLst>
+                                    <p:cond delay="0"/>
+                                  </p:stCondLst>
+                                  <p:childTnLst>
+                                    <p:set>
+                                      <p:cBhvr>
+                                        <p:cTn id="6" dur="1" fill="hold">
+                                          <p:stCondLst>
+                                            <p:cond delay="0"/>
+                                          </p:stCondLst>
+                                        </p:cTn>
+                                        <p:tgtEl>
+                                          <p:spTgt spid="3">
+                                            <p:txEl>
+                                              <p:pRg st="0" end="0"/>
+                                            </p:txEl>
+                                          </p:spTgt>
+                                        </p:tgtEl>
+                                        <p:attrNameLst>
+                                          <p:attrName>style.visibility</p:attrName>
+                                        </p:attrNameLst>
+                                      </p:cBhvr>
+                                      <p:to>
+                                        <p:strVal val="visible"/>
+                                      </p:to>
+                                    </p:set>
+                                  </p:childTnLst>
+                                </p:cTn>
+                              </p:par>
+                              <p:par>
+                                <p:cTn id="7" presetID="1" presetClass="entr" presetSubtype="0" fill="hold" nodeType="withEffect">
+                                  <p:stCondLst>
+                                    <p:cond delay="0"/>
+                                  </p:stCondLst>
+                                  <p:childTnLst>
+                                    <p:set>
+                                      <p:cBhvr>
+                                        <p:cTn id="8" dur="1" fill="hold">
+                                          <p:stCondLst>
+                                            <p:cond delay="0"/>
+                                          </p:stCondLst>
+                                        </p:cTn>
+                                        <p:tgtEl>
+                                          <p:spTgt spid="3">
+                                            <p:txEl>
+                                              <p:pRg st="1" end="1"/>
+                                            </p:txEl>
+                                          </p:spTgt>
+                                        </p:tgtEl>
+                                        <p:attrNameLst>
+                                          <p:attrName>style.visibility</p:attrName>
+                                        </p:attrNameLst>
+                                      </p:cBhvr>
+                                      <p:to>
+                                        <p:strVal val="visible"/>
+                                      </p:to>
+                                    </p:set>
+                                  </p:childTnLst>
+                                </p:cTn>
+                              </p:par>
+                            </p:childTnLst>
+                          </p:cTn>
+                        </p:par>
+                      </p:childTnLst>
+                    </p:cTn>
+                  </p:par>
+                  <p:par>
+                    <p:cTn id="9" fill="hold">
+                      <p:stCondLst>
+                        <p:cond delay="indefinite"/>
+                      </p:stCondLst>
+                      <p:childTnLst>
+                        <p:par>
+                          <p:cTn id="10" fill="hold">
+                            <p:stCondLst>
+                              <p:cond delay="0"/>
+                            </p:stCondLst>
+                            <p:childTnLst>
+                              <p:par>
+                                <p:cTn id="11" presetID="1" presetClass="entr" presetSubtype="0" fill="hold" nodeType="clickEffect">
+                                  <p:stCondLst>
+                                    <p:cond delay="0"/>
+                                  </p:stCondLst>
+                                  <p:childTnLst>
+                                    <p:set>
+                                      <p:cBhvr>
+                                        <p:cTn id="12" dur="1" fill="hold">
+                                          <p:stCondLst>
+                                            <p:cond delay="0"/>
+                                          </p:stCondLst>
+                                        </p:cTn>
+                                        <p:tgtEl>
+                                          <p:spTgt spid="3">
+                                            <p:txEl>
+                                              <p:pRg st="3" end="3"/>
+                                            </p:txEl>
+                                          </p:spTgt>
+                                        </p:tgtEl>
+                                        <p:attrNameLst>
+                                          <p:attrName>style.visibility</p:attrName>
+                                        </p:attrNameLst>
+                                      </p:cBhvr>
+                                      <p:to>
+                                        <p:strVal val="visible"/>
+                                      </p:to>
+                                    </p:set>
+                                  </p:childTnLst>
+                                </p:cTn>
+                              </p:par>
+                              <p:par>
+                                <p:cTn id="13" presetID="1" presetClass="entr" presetSubtype="0" fill="hold" nodeType="withEffect">
+                                  <p:stCondLst>
+                                    <p:cond delay="0"/>
+                                  </p:stCondLst>
+                                  <p:childTnLst>
+                                    <p:set>
+                                      <p:cBhvr>
+                                        <p:cTn id="14" dur="1" fill="hold">
+                                          <p:stCondLst>
+                                            <p:cond delay="0"/>
+                                          </p:stCondLst>
+                                        </p:cTn>
+                                        <p:tgtEl>
+                                          <p:spTgt spid="3">
+                                            <p:txEl>
+                                              <p:pRg st="4" end="4"/>
+                                            </p:txEl>
+                                          </p:spTgt>
+                                        </p:tgtEl>
+                                        <p:attrNameLst>
+                                          <p:attrName>style.visibility</p:attrName>
+                                        </p:attrNameLst>
+                                      </p:cBhvr>
+                                      <p:to>
+                                        <p:strVal val="visible"/>
+                                      </p:to>
+                                    </p:set>
+                                  </p:childTnLst>
+                                </p:cTn>
+                              </p:par>
+                              <p:par>
+                                <p:cTn id="15" presetID="1" presetClass="entr" presetSubtype="0" fill="hold" nodeType="withEffect">
+                                  <p:stCondLst>
+                                    <p:cond delay="0"/>
+                                  </p:stCondLst>
+                                  <p:childTnLst>
+                                    <p:set>
+                                      <p:cBhvr>
+                                        <p:cTn id="16" dur="1" fill="hold">
+                                          <p:stCondLst>
+                                            <p:cond delay="0"/>
+                                          </p:stCondLst>
+                                        </p:cTn>
+                                        <p:tgtEl>
+                                          <p:spTgt spid="3">
+                                            <p:txEl>
+                                              <p:pRg st="5" end="5"/>
+                                            </p:txEl>
+                                          </p:spTgt>
+                                        </p:tgtEl>
+                                        <p:attrNameLst>
+                                          <p:attrName>style.visibility</p:attrName>
+                                        </p:attrNameLst>
+                                      </p:cBhvr>
+                                      <p:to>
+                                        <p:strVal val="visible"/>
+                                      </p:to>
+                                    </p:set>
+                                  </p:childTnLst>
+                                </p:cTn>
+                              </p:par>
+                            </p:childTnLst>
+                          </p:cTn>
+                        </p:par>
+                      </p:childTnLst>
+                    </p:cTn>
+                  </p:par>
+                </p:childTnLst>
+              </p:cTn>
+              <p:prevCondLst>
+                <p:cond evt="onPrev" delay="0">
+                  <p:tgtEl>
+                    <p:sldTgt/>
+                  </p:tgtEl>
+                </p:cond>
+              </p:prevCondLst>
+              <p:nextCondLst>
+                <p:cond evt="onNext" delay="0">
+                  <p:tgtEl>
+                    <p:sldTgt/>
+                  </p:tgtEl>
+                </p:cond>
+              </p:nextCondLst>
+            </p:seq>
+          </p:childTnLst>
+        </p:cTn>
       </p:par>
     </p:tnLst>
   </p:timing>
@@ -8112,7 +8367,15 @@
           <a:p>
             <a:r>
               <a:rPr lang="en-US" dirty="0" smtClean="0"/>
-              <a:t>enter, python!</a:t>
+              <a:t>critical </a:t>
+            </a:r>
+            <a:r>
+              <a:rPr lang="en-US" dirty="0" err="1" smtClean="0"/>
+              <a:t>psa</a:t>
+            </a:r>
+            <a:r>
+              <a:rPr lang="en-US" dirty="0" smtClean="0"/>
+              <a:t>: text editors</a:t>
             </a:r>
             <a:endParaRPr lang="en-US" dirty="0"/>
           </a:p>
@@ -8128,158 +8391,193 @@
             <p:ph idx="1"/>
           </p:nvPr>
         </p:nvSpPr>
-        <p:spPr>
-          <a:xfrm>
-            <a:off x="457200" y="1752600"/>
-            <a:ext cx="8686800" cy="4373563"/>
-          </a:xfrm>
-        </p:spPr>
+        <p:spPr/>
         <p:txBody>
           <a:bodyPr>
-            <a:normAutofit lnSpcReduction="10000"/>
+            <a:normAutofit fontScale="92500" lnSpcReduction="10000"/>
           </a:bodyPr>
           <a:lstStyle/>
           <a:p>
             <a:pPr marL="457200" indent="-457200">
-              <a:buFont typeface="Arial"/>
+              <a:buFont typeface="Arial" charset="0"/>
               <a:buChar char="•"/>
             </a:pPr>
             <a:r>
-              <a:rPr lang="en-US" dirty="0"/>
-              <a:t>Python is an </a:t>
-            </a:r>
-            <a:r>
-              <a:rPr lang="en-US" i="1" dirty="0"/>
-              <a:t>interpreted</a:t>
-            </a:r>
-            <a:r>
-              <a:rPr lang="en-US" dirty="0"/>
-              <a:t> language</a:t>
-            </a:r>
-          </a:p>
-          <a:p>
-            <a:pPr marL="914400" lvl="1" indent="-457200">
-              <a:buFont typeface="Arial"/>
+              <a:rPr lang="en-US" dirty="0" smtClean="0"/>
+              <a:t>Microsoft Word is not a text editor!!!!!!! I’m so serious!!!</a:t>
+            </a:r>
+            <a:endParaRPr lang="en-US" dirty="0"/>
+          </a:p>
+          <a:p>
+            <a:pPr marL="457200" indent="-457200">
+              <a:buFont typeface="Arial" charset="0"/>
               <a:buChar char="•"/>
             </a:pPr>
             <a:r>
-              <a:rPr lang="en-US" dirty="0"/>
-              <a:t>We can code either using the interpreter directly or using </a:t>
-            </a:r>
-            <a:r>
-              <a:rPr lang="en-US" i="1" dirty="0"/>
-              <a:t>scripts</a:t>
-            </a:r>
-            <a:r>
-              <a:rPr lang="en-US" dirty="0"/>
-              <a:t> (text files with python code)</a:t>
-            </a:r>
-          </a:p>
-          <a:p>
-            <a:pPr marL="457200" indent="-457200">
-              <a:buFont typeface="Arial"/>
+              <a:rPr lang="en-US" dirty="0" smtClean="0"/>
+              <a:t>GUI</a:t>
+            </a:r>
+          </a:p>
+          <a:p>
+            <a:pPr marL="914400" lvl="1" indent="-457200">
+              <a:buFont typeface="Arial" charset="0"/>
               <a:buChar char="•"/>
             </a:pPr>
+            <a:r>
+              <a:rPr lang="en-US" strike="sngStrike" dirty="0" err="1" smtClean="0"/>
+              <a:t>TextEdit</a:t>
+            </a:r>
+            <a:r>
+              <a:rPr lang="en-US" strike="sngStrike" dirty="0" smtClean="0"/>
+              <a:t> and </a:t>
+            </a:r>
+            <a:r>
+              <a:rPr lang="en-US" strike="sngStrike" dirty="0" smtClean="0"/>
+              <a:t>Notepad </a:t>
+            </a:r>
+            <a:r>
+              <a:rPr lang="en-US" dirty="0" smtClean="0"/>
+              <a:t>(</a:t>
+            </a:r>
+            <a:r>
+              <a:rPr lang="en-US" dirty="0" err="1" smtClean="0"/>
+              <a:t>NotePad</a:t>
+            </a:r>
+            <a:r>
+              <a:rPr lang="en-US" dirty="0" smtClean="0"/>
+              <a:t>++ should be </a:t>
+            </a:r>
+            <a:r>
+              <a:rPr lang="en-US" smtClean="0"/>
+              <a:t>ok)</a:t>
+            </a:r>
             <a:endParaRPr lang="en-US" dirty="0" smtClean="0"/>
           </a:p>
           <a:p>
-            <a:pPr marL="457200" indent="-457200">
-              <a:buFont typeface="Arial"/>
+            <a:pPr marL="914400" lvl="1" indent="-457200">
+              <a:buFont typeface="Arial" charset="0"/>
               <a:buChar char="•"/>
             </a:pPr>
             <a:r>
+              <a:rPr lang="en-US" dirty="0" err="1" smtClean="0"/>
+              <a:t>Textwrangler</a:t>
+            </a:r>
+            <a:r>
               <a:rPr lang="en-US" dirty="0" smtClean="0"/>
-              <a:t>Python is an </a:t>
-            </a:r>
-            <a:r>
-              <a:rPr lang="en-US" i="1" dirty="0" smtClean="0"/>
-              <a:t>object-oriented </a:t>
-            </a:r>
-            <a:r>
-              <a:rPr lang="en-US" i="1" dirty="0" smtClean="0"/>
-              <a:t>language</a:t>
-            </a:r>
-          </a:p>
-          <a:p>
-            <a:pPr marL="457200" indent="-457200">
-              <a:buFont typeface="Arial"/>
+              <a:t>/BBEdit </a:t>
+            </a:r>
+            <a:r>
+              <a:rPr lang="en-US" dirty="0" smtClean="0"/>
+              <a:t>for Macs</a:t>
+            </a:r>
+          </a:p>
+          <a:p>
+            <a:pPr marL="914400" lvl="1" indent="-457200">
+              <a:buFont typeface="Arial" charset="0"/>
               <a:buChar char="•"/>
             </a:pPr>
-            <a:endParaRPr lang="en-US" i="1" dirty="0"/>
-          </a:p>
-          <a:p>
-            <a:pPr marL="457200" indent="-457200">
-              <a:buFont typeface="Arial"/>
+            <a:r>
+              <a:rPr lang="en-US" dirty="0" smtClean="0"/>
+              <a:t>Sublime 3 for </a:t>
+            </a:r>
+            <a:r>
+              <a:rPr lang="en-US" dirty="0" smtClean="0"/>
+              <a:t>any system</a:t>
+            </a:r>
+            <a:endParaRPr lang="en-US" dirty="0" smtClean="0"/>
+          </a:p>
+          <a:p>
+            <a:pPr marL="914400" lvl="1" indent="-457200">
+              <a:buFont typeface="Arial" charset="0"/>
               <a:buChar char="•"/>
             </a:pPr>
             <a:r>
-              <a:rPr lang="en-US" dirty="0"/>
-              <a:t>Each </a:t>
-            </a:r>
-            <a:r>
               <a:rPr lang="en-US" dirty="0" smtClean="0"/>
-              <a:t>variable is an </a:t>
-            </a:r>
-            <a:r>
-              <a:rPr lang="en-US" i="1" dirty="0" smtClean="0"/>
-              <a:t>object</a:t>
-            </a:r>
-            <a:r>
-              <a:rPr lang="en-US" dirty="0" smtClean="0"/>
-              <a:t> with a a </a:t>
-            </a:r>
-            <a:r>
-              <a:rPr lang="en-US" i="1" dirty="0"/>
-              <a:t>name</a:t>
-            </a:r>
-            <a:r>
-              <a:rPr lang="en-US" dirty="0"/>
-              <a:t>, </a:t>
-            </a:r>
-            <a:r>
-              <a:rPr lang="en-US" i="1" dirty="0"/>
-              <a:t>value</a:t>
-            </a:r>
-            <a:r>
-              <a:rPr lang="en-US" dirty="0"/>
-              <a:t>, and </a:t>
-            </a:r>
-            <a:r>
-              <a:rPr lang="en-US" i="1" dirty="0"/>
-              <a:t>type</a:t>
-            </a:r>
-          </a:p>
-          <a:p>
-            <a:pPr marL="914400" lvl="1" indent="-457200">
-              <a:buFont typeface="Arial"/>
+              <a:t>Atom for the dedicated and deeply interested</a:t>
+            </a:r>
+            <a:endParaRPr lang="en-US" dirty="0" smtClean="0"/>
+          </a:p>
+          <a:p>
+            <a:pPr marL="457200" indent="-457200">
+              <a:buFont typeface="Arial" charset="0"/>
               <a:buChar char="•"/>
             </a:pPr>
             <a:r>
-              <a:rPr lang="en-US" dirty="0"/>
-              <a:t>The </a:t>
-            </a:r>
-            <a:r>
-              <a:rPr lang="en-US" i="1" dirty="0"/>
-              <a:t>type</a:t>
-            </a:r>
-            <a:r>
-              <a:rPr lang="en-US" dirty="0"/>
-              <a:t> determines what you can do with the variable</a:t>
-            </a:r>
-          </a:p>
-          <a:p>
-            <a:pPr marL="457200" indent="-457200">
-              <a:buFont typeface="Arial"/>
+              <a:rPr lang="en-US" dirty="0" smtClean="0"/>
+              <a:t>CLI</a:t>
+            </a:r>
+          </a:p>
+          <a:p>
+            <a:pPr marL="914400" lvl="1" indent="-457200">
+              <a:buFont typeface="Arial" charset="0"/>
               <a:buChar char="•"/>
             </a:pPr>
-            <a:endParaRPr lang="en-US" dirty="0" smtClean="0"/>
+            <a:r>
+              <a:rPr lang="en-US" dirty="0" smtClean="0"/>
+              <a:t>Vim/vi, </a:t>
+            </a:r>
+            <a:r>
+              <a:rPr lang="en-US" dirty="0" err="1" smtClean="0"/>
+              <a:t>emacs</a:t>
+            </a:r>
+            <a:r>
+              <a:rPr lang="en-US" dirty="0" smtClean="0"/>
+              <a:t>, </a:t>
+            </a:r>
+            <a:r>
+              <a:rPr lang="en-US" dirty="0" err="1" smtClean="0"/>
+              <a:t>nano</a:t>
+            </a:r>
+            <a:r>
+              <a:rPr lang="en-US" dirty="0" smtClean="0"/>
+              <a:t>, </a:t>
+            </a:r>
+            <a:r>
+              <a:rPr lang="en-US" dirty="0" err="1" smtClean="0"/>
+              <a:t>pico</a:t>
+            </a:r>
+            <a:r>
+              <a:rPr lang="en-US" dirty="0" smtClean="0"/>
+              <a:t> (b/c puns)</a:t>
+            </a:r>
+          </a:p>
+          <a:p>
+            <a:pPr marL="914400" lvl="1" indent="-457200">
+              <a:buFont typeface="Arial" charset="0"/>
+              <a:buChar char="•"/>
+            </a:pPr>
+            <a:r>
+              <a:rPr lang="en-US" dirty="0">
+                <a:hlinkClick r:id="rId2"/>
+              </a:rPr>
+              <a:t>https://</a:t>
+            </a:r>
+            <a:r>
+              <a:rPr lang="en-US" dirty="0" err="1">
+                <a:hlinkClick r:id="rId2"/>
+              </a:rPr>
+              <a:t>en.wikipedia.org</a:t>
+            </a:r>
+            <a:r>
+              <a:rPr lang="en-US" dirty="0">
+                <a:hlinkClick r:id="rId2"/>
+              </a:rPr>
+              <a:t>/wiki/</a:t>
+            </a:r>
+            <a:r>
+              <a:rPr lang="en-US" dirty="0" err="1">
+                <a:hlinkClick r:id="rId2"/>
+              </a:rPr>
+              <a:t>Editor_war</a:t>
+            </a:r>
+            <a:endParaRPr lang="en-US" dirty="0"/>
           </a:p>
         </p:txBody>
       </p:sp>
     </p:spTree>
     <p:extLst>
       <p:ext uri="{BB962C8B-B14F-4D97-AF65-F5344CB8AC3E}">
-        <p14:creationId xmlns:p14="http://schemas.microsoft.com/office/powerpoint/2010/main" val="1035205068"/>
+        <p14:creationId xmlns:p14="http://schemas.microsoft.com/office/powerpoint/2010/main" val="1955573593"/>
       </p:ext>
     </p:extLst>
   </p:cSld>
@@ -8650,15 +8948,7 @@
                   <a:srgbClr val="DC5924"/>
                 </a:solidFill>
               </a:rPr>
-              <a:t>Floats have *decimals</a:t>
-            </a:r>
-            <a:r>
-              <a:rPr lang="en-US" sz="2000" dirty="0" smtClean="0">
-                <a:solidFill>
-                  <a:srgbClr val="DC5924"/>
-                </a:solidFill>
-              </a:rPr>
-              <a:t>*</a:t>
+              <a:t>Floats have *decimals*</a:t>
             </a:r>
             <a:endParaRPr lang="en-US" sz="2000" dirty="0">
               <a:solidFill>
@@ -9399,14 +9689,7 @@
                 <a:latin typeface="Monaco"/>
                 <a:cs typeface="Monaco"/>
               </a:rPr>
-              <a:t> = 0</a:t>
-            </a:r>
-            <a:r>
-              <a:rPr lang="en-US" sz="2200" dirty="0" smtClean="0">
-                <a:latin typeface="Monaco"/>
-                <a:cs typeface="Monaco"/>
-              </a:rPr>
-              <a:t>.  </a:t>
+              <a:t> = 0.  </a:t>
             </a:r>
             <a:r>
               <a:rPr lang="en-US" sz="2200" dirty="0" smtClean="0">
@@ -9804,11 +10087,6 @@
               </a:rPr>
               <a:t>**</a:t>
             </a:r>
-            <a:endParaRPr lang="en-US" dirty="0" smtClean="0">
-              <a:latin typeface="Monaco" charset="0"/>
-              <a:ea typeface="Monaco" charset="0"/>
-              <a:cs typeface="Monaco" charset="0"/>
-            </a:endParaRPr>
           </a:p>
           <a:p>
             <a:pPr lvl="1" indent="0">
@@ -9951,20 +10229,7 @@
                 <a:latin typeface="Monaco"/>
                 <a:cs typeface="Monaco"/>
               </a:rPr>
-              <a:t>#c now has a value -</a:t>
-            </a:r>
-            <a:r>
-              <a:rPr lang="en-US" sz="2200" dirty="0" smtClean="0">
-                <a:solidFill>
-                  <a:schemeClr val="accent3">
-                    <a:lumMod val="60000"/>
-                    <a:lumOff val="40000"/>
-                  </a:schemeClr>
-                </a:solidFill>
-                <a:latin typeface="Monaco"/>
-                <a:cs typeface="Monaco"/>
-              </a:rPr>
-              <a:t>28</a:t>
+              <a:t>#c now has a value -28</a:t>
             </a:r>
           </a:p>
           <a:p>
@@ -10065,14 +10330,7 @@
                 <a:latin typeface="Monaco"/>
                 <a:cs typeface="Monaco"/>
               </a:rPr>
-              <a:t>a </a:t>
-            </a:r>
-            <a:r>
-              <a:rPr lang="en-US" sz="2200" dirty="0" smtClean="0">
-                <a:latin typeface="Monaco"/>
-                <a:cs typeface="Monaco"/>
-              </a:rPr>
-              <a:t>= 5.0</a:t>
+              <a:t>a = 5.0</a:t>
             </a:r>
           </a:p>
           <a:p>
@@ -10103,20 +10361,7 @@
                 <a:latin typeface="Monaco"/>
                 <a:cs typeface="Monaco"/>
               </a:rPr>
-              <a:t>#c now has a value -</a:t>
-            </a:r>
-            <a:r>
-              <a:rPr lang="en-US" sz="2200" dirty="0" smtClean="0">
-                <a:solidFill>
-                  <a:schemeClr val="accent3">
-                    <a:lumMod val="60000"/>
-                    <a:lumOff val="40000"/>
-                  </a:schemeClr>
-                </a:solidFill>
-                <a:latin typeface="Monaco"/>
-                <a:cs typeface="Monaco"/>
-              </a:rPr>
-              <a:t>28.0</a:t>
+              <a:t>#c now has a value -28.0</a:t>
             </a:r>
           </a:p>
           <a:p>
@@ -10302,7 +10547,7 @@
                                           </p:stCondLst>
                                         </p:cTn>
                                         <p:tgtEl>
-                                          <p:spTgt spid="6"/>
+                                          <p:spTgt spid="7"/>
                                         </p:tgtEl>
                                         <p:attrNameLst>
                                           <p:attrName>style.visibility</p:attrName>
@@ -10334,7 +10579,7 @@
                             </p:stCondLst>
                             <p:childTnLst>
                               <p:par>
-                                <p:cTn id="13" presetID="1" presetClass="entr" presetSubtype="0" fill="hold" grpId="0" nodeType="clickEffect">
+                                <p:cTn id="13" presetID="1" presetClass="entr" presetSubtype="0" fill="hold" nodeType="clickEffect">
                                   <p:stCondLst>
                                     <p:cond delay="0"/>
                                   </p:stCondLst>
@@ -10342,51 +10587,6 @@
                                     <p:set>
                                       <p:cBhvr>
                                         <p:cTn id="14" dur="1" fill="hold">
-                                          <p:stCondLst>
-                                            <p:cond delay="0"/>
-                                          </p:stCondLst>
-                                        </p:cTn>
-                                        <p:tgtEl>
-                                          <p:spTgt spid="7"/>
-                                        </p:tgtEl>
-                                        <p:attrNameLst>
-                                          <p:attrName>style.visibility</p:attrName>
-                                        </p:attrNameLst>
-                                      </p:cBhvr>
-                                      <p:to>
-                                        <p:strVal val="visible"/>
-                                      </p:to>
-                                    </p:set>
-                                  </p:childTnLst>
-                                </p:cTn>
-                              </p:par>
-                            </p:childTnLst>
-                          </p:cTn>
-                        </p:par>
-                      </p:childTnLst>
-                    </p:cTn>
-                  </p:par>
-                  <p:par>
-                    <p:cTn id="15" fill="hold">
-                      <p:stCondLst>
-                        <p:cond delay="indefinite"/>
-                      </p:stCondLst>
-                      <p:childTnLst>
-                        <p:par>
-                          <p:cTn id="16" fill="hold">
-                            <p:stCondLst>
-                              <p:cond delay="0"/>
-                            </p:stCondLst>
-                            <p:childTnLst>
-                              <p:par>
-                                <p:cTn id="17" presetID="1" presetClass="entr" presetSubtype="0" fill="hold" nodeType="clickEffect">
-                                  <p:stCondLst>
-                                    <p:cond delay="0"/>
-                                  </p:stCondLst>
-                                  <p:childTnLst>
-                                    <p:set>
-                                      <p:cBhvr>
-                                        <p:cTn id="18" dur="1" fill="hold">
                                           <p:stCondLst>
                                             <p:cond delay="0"/>
                                           </p:stCondLst>
@@ -10410,14 +10610,14 @@
                                 </p:cTn>
                               </p:par>
                               <p:par>
-                                <p:cTn id="19" presetID="1" presetClass="entr" presetSubtype="0" fill="hold" nodeType="withEffect">
+                                <p:cTn id="15" presetID="1" presetClass="entr" presetSubtype="0" fill="hold" nodeType="withEffect">
                                   <p:stCondLst>
                                     <p:cond delay="0"/>
                                   </p:stCondLst>
                                   <p:childTnLst>
                                     <p:set>
                                       <p:cBhvr>
-                                        <p:cTn id="20" dur="1" fill="hold">
+                                        <p:cTn id="16" dur="1" fill="hold">
                                           <p:stCondLst>
                                             <p:cond delay="0"/>
                                           </p:stCondLst>
@@ -10469,7 +10669,6 @@
     </p:tnLst>
     <p:bldLst>
       <p:bldP spid="5" grpId="0"/>
-      <p:bldP spid="6" grpId="0"/>
       <p:bldP spid="7" grpId="0"/>
     </p:bldLst>
   </p:timing>
@@ -11309,46 +11508,16 @@
                 <a:latin typeface="Monaco"/>
                 <a:cs typeface="Monaco"/>
               </a:rPr>
-              <a:t># </a:t>
-            </a:r>
+              <a:t># Python2</a:t>
+            </a:r>
+          </a:p>
+          <a:p>
             <a:r>
               <a:rPr lang="en-US" sz="2200" dirty="0" smtClean="0">
-                <a:solidFill>
-                  <a:schemeClr val="accent3">
-                    <a:lumMod val="60000"/>
-                    <a:lumOff val="40000"/>
-                  </a:schemeClr>
-                </a:solidFill>
-                <a:latin typeface="Monaco"/>
-                <a:cs typeface="Monaco"/>
-              </a:rPr>
-              <a:t>Python2</a:t>
-            </a:r>
-            <a:endParaRPr lang="en-US" sz="2200" dirty="0" smtClean="0">
-              <a:solidFill>
-                <a:schemeClr val="accent3">
-                  <a:lumMod val="60000"/>
-                  <a:lumOff val="40000"/>
-                </a:schemeClr>
-              </a:solidFill>
-              <a:latin typeface="Monaco"/>
-              <a:cs typeface="Monaco"/>
-            </a:endParaRPr>
-          </a:p>
-          <a:p>
-            <a:r>
-              <a:rPr lang="en-US" sz="2200" dirty="0" smtClean="0">
-                <a:latin typeface="Monaco"/>
-                <a:cs typeface="Monaco"/>
-              </a:rPr>
-              <a:t>5 / </a:t>
-            </a:r>
-            <a:r>
-              <a:rPr lang="en-US" sz="2200" dirty="0" smtClean="0">
-                <a:latin typeface="Monaco"/>
-                <a:cs typeface="Monaco"/>
-              </a:rPr>
-              <a:t>7</a:t>
+                <a:latin typeface="Monaco"/>
+                <a:cs typeface="Monaco"/>
+              </a:rPr>
+              <a:t>5 / 7</a:t>
             </a:r>
           </a:p>
           <a:p>
@@ -11376,15 +11545,6 @@
               </a:rPr>
               <a:t>0</a:t>
             </a:r>
-            <a:endParaRPr lang="en-US" sz="2200" dirty="0" smtClean="0">
-              <a:solidFill>
-                <a:schemeClr val="bg1">
-                  <a:lumMod val="65000"/>
-                </a:schemeClr>
-              </a:solidFill>
-              <a:latin typeface="Monaco"/>
-              <a:cs typeface="Monaco"/>
-            </a:endParaRPr>
           </a:p>
         </p:txBody>
       </p:sp>
@@ -11528,6 +11688,13 @@
   <p:clrMapOvr>
     <a:masterClrMapping/>
   </p:clrMapOvr>
+  <p:timing>
+    <p:tnLst>
+      <p:par>
+        <p:cTn id="1" dur="indefinite" restart="never" nodeType="tmRoot"/>
+      </p:par>
+    </p:tnLst>
+  </p:timing>
 </p:sld>
 </file>
 
@@ -12541,10 +12708,6 @@
                         </a:rPr>
                         <a:t>is, is not</a:t>
                       </a:r>
-                      <a:endParaRPr lang="en-US" dirty="0" smtClean="0">
-                        <a:latin typeface="Monaco"/>
-                        <a:cs typeface="Monaco"/>
-                      </a:endParaRPr>
                     </a:p>
                   </a:txBody>
                   <a:tcPr/>
@@ -12860,17 +13023,7 @@
                 <a:latin typeface="Monaco"/>
                 <a:cs typeface="Monaco"/>
               </a:rPr>
-              <a:t>  </a:t>
-            </a:r>
-            <a:r>
-              <a:rPr lang="en-US" sz="2200" dirty="0" smtClean="0">
-                <a:solidFill>
-                  <a:srgbClr val="A6A6A6"/>
-                </a:solidFill>
-                <a:latin typeface="Monaco"/>
-                <a:cs typeface="Monaco"/>
-              </a:rPr>
-              <a:t>False</a:t>
+              <a:t>  False</a:t>
             </a:r>
           </a:p>
           <a:p>
@@ -13731,33 +13884,8 @@
                 <a:latin typeface="Monaco"/>
                 <a:cs typeface="Monaco"/>
               </a:rPr>
-              <a:t>print(b != 7 and </a:t>
-            </a:r>
-            <a:r>
-              <a:rPr lang="en-US" dirty="0" smtClean="0">
-                <a:latin typeface="Monaco"/>
-                <a:cs typeface="Monaco"/>
-              </a:rPr>
-              <a:t>c </a:t>
-            </a:r>
-            <a:r>
-              <a:rPr lang="en-US" dirty="0" smtClean="0">
-                <a:latin typeface="Monaco"/>
-                <a:cs typeface="Monaco"/>
-              </a:rPr>
-              <a:t>&lt;= </a:t>
-            </a:r>
-            <a:r>
-              <a:rPr lang="en-US" dirty="0" smtClean="0">
-                <a:latin typeface="Monaco"/>
-                <a:cs typeface="Monaco"/>
-              </a:rPr>
-              <a:t>11)</a:t>
-            </a:r>
-            <a:endParaRPr lang="en-US" dirty="0" smtClean="0">
-              <a:latin typeface="Monaco"/>
-              <a:cs typeface="Monaco"/>
-            </a:endParaRPr>
+              <a:t>print(b != 7 and c &lt;= 11)</a:t>
+            </a:r>
           </a:p>
           <a:p>
             <a:r>
@@ -13796,14 +13924,7 @@
                 <a:latin typeface="Monaco"/>
                 <a:cs typeface="Monaco"/>
               </a:rPr>
-              <a:t>print(c </a:t>
-            </a:r>
-            <a:r>
-              <a:rPr lang="en-US" dirty="0" smtClean="0">
-                <a:latin typeface="Monaco"/>
-                <a:cs typeface="Monaco"/>
-              </a:rPr>
-              <a:t>== -8.34 </a:t>
+              <a:t>print(c == -8.34 </a:t>
             </a:r>
             <a:r>
               <a:rPr lang="en-US" dirty="0">
@@ -15024,33 +15145,8 @@
                 <a:latin typeface="Monaco"/>
                 <a:cs typeface="Monaco"/>
               </a:rPr>
-              <a:t>	</a:t>
-            </a:r>
-            <a:r>
-              <a:rPr lang="en-US" sz="2200" dirty="0" smtClean="0">
-                <a:latin typeface="Monaco"/>
-                <a:cs typeface="Monaco"/>
-              </a:rPr>
-              <a:t>print("a </a:t>
-            </a:r>
-            <a:r>
-              <a:rPr lang="en-US" sz="2200" dirty="0" smtClean="0">
-                <a:latin typeface="Monaco"/>
-                <a:cs typeface="Monaco"/>
-              </a:rPr>
-              <a:t>is bigger</a:t>
-            </a:r>
-            <a:r>
-              <a:rPr lang="en-US" sz="2200" dirty="0" smtClean="0">
-                <a:latin typeface="Monaco"/>
-                <a:cs typeface="Monaco"/>
-              </a:rPr>
-              <a:t>")</a:t>
-            </a:r>
-            <a:endParaRPr lang="en-US" sz="2200" dirty="0" smtClean="0">
-              <a:latin typeface="Monaco"/>
-              <a:cs typeface="Monaco"/>
-            </a:endParaRPr>
+              <a:t>	print("a is bigger")</a:t>
+            </a:r>
           </a:p>
           <a:p>
             <a:endParaRPr lang="en-US" sz="2200" dirty="0">
@@ -15069,19 +15165,7 @@
                 <a:latin typeface="Monaco"/>
                 <a:cs typeface="Monaco"/>
               </a:rPr>
-              <a:t>a </a:t>
-            </a:r>
-            <a:r>
-              <a:rPr lang="en-US" sz="2200" dirty="0" smtClean="0">
-                <a:solidFill>
-                  <a:schemeClr val="bg1">
-                    <a:lumMod val="65000"/>
-                  </a:schemeClr>
-                </a:solidFill>
-                <a:latin typeface="Monaco"/>
-                <a:cs typeface="Monaco"/>
-              </a:rPr>
-              <a:t>is bigger</a:t>
+              <a:t>a is bigger</a:t>
             </a:r>
           </a:p>
         </p:txBody>
@@ -15245,6 +15329,13 @@
   <p:clrMapOvr>
     <a:masterClrMapping/>
   </p:clrMapOvr>
+  <p:timing>
+    <p:tnLst>
+      <p:par>
+        <p:cTn id="1" dur="indefinite" restart="never" nodeType="tmRoot"/>
+      </p:par>
+    </p:tnLst>
+  </p:timing>
 </p:sld>
 </file>
 
@@ -15868,6 +15959,24 @@
                 <a:latin typeface="Monaco"/>
                 <a:cs typeface="Monaco"/>
               </a:rPr>
+              <a:t>	print("a is bigger")</a:t>
+            </a:r>
+          </a:p>
+          <a:p>
+            <a:r>
+              <a:rPr lang="en-US" sz="2200" dirty="0" smtClean="0">
+                <a:latin typeface="Monaco"/>
+                <a:cs typeface="Monaco"/>
+              </a:rPr>
+              <a:t>else:</a:t>
+            </a:r>
+          </a:p>
+          <a:p>
+            <a:r>
+              <a:rPr lang="en-US" sz="2200" dirty="0">
+                <a:latin typeface="Monaco"/>
+                <a:cs typeface="Monaco"/>
+              </a:rPr>
               <a:t>	</a:t>
             </a:r>
             <a:r>
@@ -15875,69 +15984,8 @@
                 <a:latin typeface="Monaco"/>
                 <a:cs typeface="Monaco"/>
               </a:rPr>
-              <a:t>print("a </a:t>
-            </a:r>
-            <a:r>
-              <a:rPr lang="en-US" sz="2200" dirty="0" smtClean="0">
-                <a:latin typeface="Monaco"/>
-                <a:cs typeface="Monaco"/>
-              </a:rPr>
-              <a:t>is bigger</a:t>
-            </a:r>
-            <a:r>
-              <a:rPr lang="en-US" sz="2200" dirty="0" smtClean="0">
-                <a:latin typeface="Monaco"/>
-                <a:cs typeface="Monaco"/>
-              </a:rPr>
-              <a:t>")</a:t>
-            </a:r>
-            <a:endParaRPr lang="en-US" sz="2200" dirty="0" smtClean="0">
-              <a:latin typeface="Monaco"/>
-              <a:cs typeface="Monaco"/>
-            </a:endParaRPr>
-          </a:p>
-          <a:p>
-            <a:r>
-              <a:rPr lang="en-US" sz="2200" dirty="0" smtClean="0">
-                <a:latin typeface="Monaco"/>
-                <a:cs typeface="Monaco"/>
-              </a:rPr>
-              <a:t>else:</a:t>
-            </a:r>
-          </a:p>
-          <a:p>
-            <a:r>
-              <a:rPr lang="en-US" sz="2200" dirty="0">
-                <a:latin typeface="Monaco"/>
-                <a:cs typeface="Monaco"/>
-              </a:rPr>
-              <a:t>	</a:t>
-            </a:r>
-            <a:r>
-              <a:rPr lang="en-US" sz="2200" dirty="0" smtClean="0">
-                <a:latin typeface="Monaco"/>
-                <a:cs typeface="Monaco"/>
-              </a:rPr>
-              <a:t>print("a </a:t>
-            </a:r>
-            <a:r>
-              <a:rPr lang="en-US" sz="2200" dirty="0" smtClean="0">
-                <a:latin typeface="Monaco"/>
-                <a:cs typeface="Monaco"/>
-              </a:rPr>
-              <a:t>is not bigger</a:t>
-            </a:r>
-            <a:r>
-              <a:rPr lang="en-US" sz="2200" dirty="0" smtClean="0">
-                <a:latin typeface="Monaco"/>
-                <a:cs typeface="Monaco"/>
-              </a:rPr>
-              <a:t>")</a:t>
-            </a:r>
-            <a:endParaRPr lang="en-US" sz="2200" dirty="0" smtClean="0">
-              <a:latin typeface="Monaco"/>
-              <a:cs typeface="Monaco"/>
-            </a:endParaRPr>
+              <a:t>print("a is not bigger")</a:t>
+            </a:r>
           </a:p>
           <a:p>
             <a:endParaRPr lang="en-US" sz="2200" dirty="0">
@@ -16727,6 +16775,24 @@
                 <a:latin typeface="Monaco"/>
                 <a:cs typeface="Monaco"/>
               </a:rPr>
+              <a:t>	print("a is bigger")</a:t>
+            </a:r>
+          </a:p>
+          <a:p>
+            <a:r>
+              <a:rPr lang="en-US" sz="2200" dirty="0" smtClean="0">
+                <a:latin typeface="Monaco"/>
+                <a:cs typeface="Monaco"/>
+              </a:rPr>
+              <a:t>elif a &lt; b:</a:t>
+            </a:r>
+          </a:p>
+          <a:p>
+            <a:r>
+              <a:rPr lang="en-US" sz="2200" dirty="0">
+                <a:latin typeface="Monaco"/>
+                <a:cs typeface="Monaco"/>
+              </a:rPr>
               <a:t>	</a:t>
             </a:r>
             <a:r>
@@ -16734,107 +16800,32 @@
                 <a:latin typeface="Monaco"/>
                 <a:cs typeface="Monaco"/>
               </a:rPr>
-              <a:t>print("a </a:t>
-            </a:r>
+              <a:t>print("b is bigger")</a:t>
+            </a:r>
+          </a:p>
+          <a:p>
             <a:r>
               <a:rPr lang="en-US" sz="2200" dirty="0" smtClean="0">
                 <a:latin typeface="Monaco"/>
                 <a:cs typeface="Monaco"/>
               </a:rPr>
-              <a:t>is bigger</a:t>
+              <a:t>else:</a:t>
+            </a:r>
+          </a:p>
+          <a:p>
+            <a:r>
+              <a:rPr lang="en-US" sz="2200" dirty="0">
+                <a:latin typeface="Monaco"/>
+                <a:cs typeface="Monaco"/>
+              </a:rPr>
+              <a:t>	</a:t>
             </a:r>
             <a:r>
               <a:rPr lang="en-US" sz="2200" dirty="0" smtClean="0">
                 <a:latin typeface="Monaco"/>
                 <a:cs typeface="Monaco"/>
               </a:rPr>
-              <a:t>")</a:t>
-            </a:r>
-            <a:endParaRPr lang="en-US" sz="2200" dirty="0" smtClean="0">
-              <a:latin typeface="Monaco"/>
-              <a:cs typeface="Monaco"/>
-            </a:endParaRPr>
-          </a:p>
-          <a:p>
-            <a:r>
-              <a:rPr lang="en-US" sz="2200" dirty="0" smtClean="0">
-                <a:latin typeface="Monaco"/>
-                <a:cs typeface="Monaco"/>
-              </a:rPr>
-              <a:t>elif a &lt; b:</a:t>
-            </a:r>
-          </a:p>
-          <a:p>
-            <a:r>
-              <a:rPr lang="en-US" sz="2200" dirty="0">
-                <a:latin typeface="Monaco"/>
-                <a:cs typeface="Monaco"/>
-              </a:rPr>
-              <a:t>	</a:t>
-            </a:r>
-            <a:r>
-              <a:rPr lang="en-US" sz="2200" dirty="0" smtClean="0">
-                <a:latin typeface="Monaco"/>
-                <a:cs typeface="Monaco"/>
-              </a:rPr>
-              <a:t>print("b </a:t>
-            </a:r>
-            <a:r>
-              <a:rPr lang="en-US" sz="2200" dirty="0" smtClean="0">
-                <a:latin typeface="Monaco"/>
-                <a:cs typeface="Monaco"/>
-              </a:rPr>
-              <a:t>is bigger</a:t>
-            </a:r>
-            <a:r>
-              <a:rPr lang="en-US" sz="2200" dirty="0" smtClean="0">
-                <a:latin typeface="Monaco"/>
-                <a:cs typeface="Monaco"/>
-              </a:rPr>
-              <a:t>")</a:t>
-            </a:r>
-            <a:endParaRPr lang="en-US" sz="2200" dirty="0" smtClean="0">
-              <a:latin typeface="Monaco"/>
-              <a:cs typeface="Monaco"/>
-            </a:endParaRPr>
-          </a:p>
-          <a:p>
-            <a:r>
-              <a:rPr lang="en-US" sz="2200" dirty="0" smtClean="0">
-                <a:latin typeface="Monaco"/>
-                <a:cs typeface="Monaco"/>
-              </a:rPr>
-              <a:t>else:</a:t>
-            </a:r>
-          </a:p>
-          <a:p>
-            <a:r>
-              <a:rPr lang="en-US" sz="2200" dirty="0">
-                <a:latin typeface="Monaco"/>
-                <a:cs typeface="Monaco"/>
-              </a:rPr>
-              <a:t>	</a:t>
-            </a:r>
-            <a:r>
-              <a:rPr lang="en-US" sz="2200" dirty="0" smtClean="0">
-                <a:latin typeface="Monaco"/>
-                <a:cs typeface="Monaco"/>
-              </a:rPr>
-              <a:t>print("a </a:t>
-            </a:r>
-            <a:r>
-              <a:rPr lang="en-US" sz="2200" dirty="0" smtClean="0">
-                <a:latin typeface="Monaco"/>
-                <a:cs typeface="Monaco"/>
-              </a:rPr>
-              <a:t>is equal to b</a:t>
-            </a:r>
-            <a:r>
-              <a:rPr lang="en-US" sz="2200" dirty="0" smtClean="0">
-                <a:latin typeface="Monaco"/>
-                <a:cs typeface="Monaco"/>
-              </a:rPr>
-              <a:t>")</a:t>
+              <a:t>print("a is equal to b")</a:t>
             </a:r>
           </a:p>
           <a:p>
@@ -17108,6 +17099,24 @@
                 <a:latin typeface="Monaco"/>
                 <a:cs typeface="Monaco"/>
               </a:rPr>
+              <a:t>	print("a is bigger")</a:t>
+            </a:r>
+          </a:p>
+          <a:p>
+            <a:r>
+              <a:rPr lang="en-US" sz="2200" dirty="0" smtClean="0">
+                <a:latin typeface="Monaco"/>
+                <a:cs typeface="Monaco"/>
+              </a:rPr>
+              <a:t>elif a &lt; b:</a:t>
+            </a:r>
+          </a:p>
+          <a:p>
+            <a:r>
+              <a:rPr lang="en-US" sz="2200" dirty="0">
+                <a:latin typeface="Monaco"/>
+                <a:cs typeface="Monaco"/>
+              </a:rPr>
               <a:t>	</a:t>
             </a:r>
             <a:r>
@@ -17115,125 +17124,45 @@
                 <a:latin typeface="Monaco"/>
                 <a:cs typeface="Monaco"/>
               </a:rPr>
-              <a:t>print("a </a:t>
+              <a:t>print("b is bigger")</a:t>
+            </a:r>
+          </a:p>
+          <a:p>
+            <a:r>
+              <a:rPr lang="en-US" sz="2200" dirty="0" err="1" smtClean="0">
+                <a:solidFill>
+                  <a:schemeClr val="accent5"/>
+                </a:solidFill>
+                <a:latin typeface="Monaco"/>
+                <a:cs typeface="Monaco"/>
+              </a:rPr>
+              <a:t>elif</a:t>
             </a:r>
             <a:r>
               <a:rPr lang="en-US" sz="2200" dirty="0" smtClean="0">
-                <a:latin typeface="Monaco"/>
-                <a:cs typeface="Monaco"/>
-              </a:rPr>
-              <a:t>is bigger</a:t>
+                <a:solidFill>
+                  <a:schemeClr val="accent5"/>
+                </a:solidFill>
+                <a:latin typeface="Monaco"/>
+                <a:cs typeface="Monaco"/>
+              </a:rPr>
+              <a:t> a==b:</a:t>
+            </a:r>
+          </a:p>
+          <a:p>
+            <a:r>
+              <a:rPr lang="en-US" sz="2200" dirty="0">
+                <a:latin typeface="Monaco"/>
+                <a:cs typeface="Monaco"/>
+              </a:rPr>
+              <a:t>	</a:t>
             </a:r>
             <a:r>
               <a:rPr lang="en-US" sz="2200" dirty="0" smtClean="0">
                 <a:latin typeface="Monaco"/>
                 <a:cs typeface="Monaco"/>
               </a:rPr>
-              <a:t>")</a:t>
-            </a:r>
-            <a:endParaRPr lang="en-US" sz="2200" dirty="0" smtClean="0">
-              <a:latin typeface="Monaco"/>
-              <a:cs typeface="Monaco"/>
-            </a:endParaRPr>
-          </a:p>
-          <a:p>
-            <a:r>
-              <a:rPr lang="en-US" sz="2200" dirty="0" smtClean="0">
-                <a:latin typeface="Monaco"/>
-                <a:cs typeface="Monaco"/>
-              </a:rPr>
-              <a:t>elif a &lt; b:</a:t>
-            </a:r>
-          </a:p>
-          <a:p>
-            <a:r>
-              <a:rPr lang="en-US" sz="2200" dirty="0">
-                <a:latin typeface="Monaco"/>
-                <a:cs typeface="Monaco"/>
-              </a:rPr>
-              <a:t>	</a:t>
-            </a:r>
-            <a:r>
-              <a:rPr lang="en-US" sz="2200" dirty="0" smtClean="0">
-                <a:latin typeface="Monaco"/>
-                <a:cs typeface="Monaco"/>
-              </a:rPr>
-              <a:t>print("b </a:t>
-            </a:r>
-            <a:r>
-              <a:rPr lang="en-US" sz="2200" dirty="0" smtClean="0">
-                <a:latin typeface="Monaco"/>
-                <a:cs typeface="Monaco"/>
-              </a:rPr>
-              <a:t>is bigger</a:t>
-            </a:r>
-            <a:r>
-              <a:rPr lang="en-US" sz="2200" dirty="0" smtClean="0">
-                <a:latin typeface="Monaco"/>
-                <a:cs typeface="Monaco"/>
-              </a:rPr>
-              <a:t>")</a:t>
-            </a:r>
-            <a:endParaRPr lang="en-US" sz="2200" dirty="0" smtClean="0">
-              <a:latin typeface="Monaco"/>
-              <a:cs typeface="Monaco"/>
-            </a:endParaRPr>
-          </a:p>
-          <a:p>
-            <a:r>
-              <a:rPr lang="en-US" sz="2200" dirty="0" err="1" smtClean="0">
-                <a:latin typeface="Monaco"/>
-                <a:cs typeface="Monaco"/>
-              </a:rPr>
-              <a:t>elif</a:t>
-            </a:r>
-            <a:r>
-              <a:rPr lang="en-US" sz="2200" dirty="0" smtClean="0">
-                <a:latin typeface="Monaco"/>
-                <a:cs typeface="Monaco"/>
-              </a:rPr>
-              <a:t> a==b</a:t>
-            </a:r>
-            <a:r>
-              <a:rPr lang="en-US" sz="2200" dirty="0" smtClean="0">
-                <a:latin typeface="Monaco"/>
-                <a:cs typeface="Monaco"/>
-              </a:rPr>
-              <a:t>:</a:t>
-            </a:r>
-            <a:endParaRPr lang="en-US" sz="2200" dirty="0" smtClean="0">
-              <a:latin typeface="Monaco"/>
-              <a:cs typeface="Monaco"/>
-            </a:endParaRPr>
-          </a:p>
-          <a:p>
-            <a:r>
-              <a:rPr lang="en-US" sz="2200" dirty="0">
-                <a:latin typeface="Monaco"/>
-                <a:cs typeface="Monaco"/>
-              </a:rPr>
-              <a:t>	</a:t>
-            </a:r>
-            <a:r>
-              <a:rPr lang="en-US" sz="2200" dirty="0" smtClean="0">
-                <a:latin typeface="Monaco"/>
-                <a:cs typeface="Monaco"/>
-              </a:rPr>
-              <a:t>print("a </a:t>
-            </a:r>
-            <a:r>
-              <a:rPr lang="en-US" sz="2200" dirty="0" smtClean="0">
-                <a:latin typeface="Monaco"/>
-                <a:cs typeface="Monaco"/>
-              </a:rPr>
-              <a:t>is equal to b</a:t>
-            </a:r>
-            <a:r>
-              <a:rPr lang="en-US" sz="2200" dirty="0" smtClean="0">
-                <a:latin typeface="Monaco"/>
-                <a:cs typeface="Monaco"/>
-              </a:rPr>
-              <a:t>")</a:t>
+              <a:t>print("a is equal to b")</a:t>
             </a:r>
           </a:p>
           <a:p>
@@ -17577,11 +17506,7 @@
             </a:pPr>
             <a:r>
               <a:rPr lang="en-US" dirty="0" smtClean="0"/>
-              <a:t>Strings </a:t>
-            </a:r>
-            <a:r>
-              <a:rPr lang="en-US" dirty="0" smtClean="0"/>
-              <a:t>are </a:t>
+              <a:t>Strings are </a:t>
             </a:r>
             <a:r>
               <a:rPr lang="en-US" i="1" dirty="0" smtClean="0"/>
@@ -17687,46 +17612,7 @@
                 <a:latin typeface="Monaco"/>
                 <a:cs typeface="Monaco"/>
               </a:rPr>
-              <a:t># </a:t>
-            </a:r>
-            <a:r>
-              <a:rPr lang="en-US" sz="2200" dirty="0" smtClean="0">
-                <a:solidFill>
-                  <a:schemeClr val="accent3">
-                    <a:lumMod val="60000"/>
-                    <a:lumOff val="40000"/>
-                  </a:schemeClr>
-                </a:solidFill>
-                <a:latin typeface="Monaco"/>
-                <a:cs typeface="Monaco"/>
-              </a:rPr>
-              <a:t>This is not </a:t>
-            </a:r>
-            <a:r>
-              <a:rPr lang="en-US" sz="2200" dirty="0" smtClean="0">
-                <a:solidFill>
-                  <a:schemeClr val="accent3">
-                    <a:lumMod val="60000"/>
-                    <a:lumOff val="40000"/>
-                  </a:schemeClr>
-                </a:solidFill>
-                <a:latin typeface="Monaco"/>
-                <a:cs typeface="Monaco"/>
-              </a:rPr>
-              <a:t>an </a:t>
-            </a:r>
-            <a:r>
-              <a:rPr lang="en-US" sz="2200" dirty="0" smtClean="0">
-                <a:solidFill>
-                  <a:schemeClr val="accent3">
-                    <a:lumMod val="60000"/>
-                    <a:lumOff val="40000"/>
-                  </a:schemeClr>
-                </a:solidFill>
-                <a:latin typeface="Monaco"/>
-                <a:cs typeface="Monaco"/>
-              </a:rPr>
-              <a:t>integer!</a:t>
+              <a:t># This is not an integer!</a:t>
             </a:r>
           </a:p>
           <a:p>
@@ -18103,21 +17989,7 @@
                 <a:latin typeface="Monaco"/>
                 <a:cs typeface="Monaco"/>
               </a:rPr>
-              <a:t>s1 </a:t>
-            </a:r>
-            <a:r>
-              <a:rPr lang="en-US" sz="2200" dirty="0" smtClean="0">
-                <a:latin typeface="Monaco"/>
-                <a:cs typeface="Monaco"/>
-              </a:rPr>
-              <a:t>= </a:t>
-            </a:r>
-            <a:r>
-              <a:rPr lang="en-US" sz="2200" dirty="0" smtClean="0">
-                <a:latin typeface="Monaco"/>
-                <a:cs typeface="Monaco"/>
-              </a:rPr>
-              <a:t>"python"</a:t>
+              <a:t>s1 = "python"</a:t>
             </a:r>
           </a:p>
           <a:p>
@@ -18747,6 +18619,33 @@
                                   </p:childTnLst>
                                 </p:cTn>
                               </p:par>
+                              <p:par>
+                                <p:cTn id="13" presetID="1" presetClass="entr" presetSubtype="0" fill="hold" grpId="0" nodeType="withEffect">
+                                  <p:stCondLst>
+                                    <p:cond delay="0"/>
+                                  </p:stCondLst>
+                                  <p:childTnLst>
+                                    <p:set>
+                                      <p:cBhvr>
+                                        <p:cTn id="14" dur="1" fill="hold">
+                                          <p:stCondLst>
+                                            <p:cond delay="0"/>
+                                          </p:stCondLst>
+                                        </p:cTn>
+                                        <p:tgtEl>
+                                          <p:spTgt spid="8"/>
+                                        </p:tgtEl>
+                                        <p:attrNameLst>
+                                          <p:attrName>style.visibility</p:attrName>
+                                        </p:attrNameLst>
+                                      </p:cBhvr>
+                                      <p:to>
+                                        <p:strVal val="visible"/>
+                                      </p:to>
+                                    </p:set>
+                                  </p:childTnLst>
+                                </p:cTn>
+                              </p:par>
                             </p:childTnLst>
                           </p:cTn>
                         </p:par>
@@ -18754,26 +18653,26 @@
                     </p:cTn>
                   </p:par>
                   <p:par>
-                    <p:cTn id="13" fill="hold">
+                    <p:cTn id="15" fill="hold">
                       <p:stCondLst>
                         <p:cond delay="indefinite"/>
                       </p:stCondLst>
                       <p:childTnLst>
                         <p:par>
-                          <p:cTn id="14" fill="hold">
+                          <p:cTn id="16" fill="hold">
                             <p:stCondLst>
                               <p:cond delay="0"/>
                             </p:stCondLst>
                             <p:childTnLst>
                               <p:par>
-                                <p:cTn id="15" presetID="1" presetClass="entr" presetSubtype="0" fill="hold" nodeType="clickEffect">
+                                <p:cTn id="17" presetID="1" presetClass="entr" presetSubtype="0" fill="hold" nodeType="clickEffect">
                                   <p:stCondLst>
                                     <p:cond delay="0"/>
                                   </p:stCondLst>
                                   <p:childTnLst>
                                     <p:set>
                                       <p:cBhvr>
-                                        <p:cTn id="16" dur="1" fill="hold">
+                                        <p:cTn id="18" dur="1" fill="hold">
                                           <p:stCondLst>
                                             <p:cond delay="0"/>
                                           </p:stCondLst>
@@ -18797,14 +18696,14 @@
                                 </p:cTn>
                               </p:par>
                               <p:par>
-                                <p:cTn id="17" presetID="1" presetClass="entr" presetSubtype="0" fill="hold" nodeType="withEffect">
+                                <p:cTn id="19" presetID="1" presetClass="entr" presetSubtype="0" fill="hold" nodeType="withEffect">
                                   <p:stCondLst>
                                     <p:cond delay="0"/>
                                   </p:stCondLst>
                                   <p:childTnLst>
                                     <p:set>
                                       <p:cBhvr>
-                                        <p:cTn id="18" dur="1" fill="hold">
+                                        <p:cTn id="20" dur="1" fill="hold">
                                           <p:stCondLst>
                                             <p:cond delay="0"/>
                                           </p:stCondLst>
@@ -18834,26 +18733,26 @@
                     </p:cTn>
                   </p:par>
                   <p:par>
-                    <p:cTn id="19" fill="hold">
+                    <p:cTn id="21" fill="hold">
                       <p:stCondLst>
                         <p:cond delay="indefinite"/>
                       </p:stCondLst>
                       <p:childTnLst>
                         <p:par>
-                          <p:cTn id="20" fill="hold">
+                          <p:cTn id="22" fill="hold">
                             <p:stCondLst>
                               <p:cond delay="0"/>
                             </p:stCondLst>
                             <p:childTnLst>
                               <p:par>
-                                <p:cTn id="21" presetID="1" presetClass="entr" presetSubtype="0" fill="hold" nodeType="clickEffect">
+                                <p:cTn id="23" presetID="1" presetClass="entr" presetSubtype="0" fill="hold" nodeType="clickEffect">
                                   <p:stCondLst>
                                     <p:cond delay="0"/>
                                   </p:stCondLst>
                                   <p:childTnLst>
                                     <p:set>
                                       <p:cBhvr>
-                                        <p:cTn id="22" dur="1" fill="hold">
+                                        <p:cTn id="24" dur="1" fill="hold">
                                           <p:stCondLst>
                                             <p:cond delay="0"/>
                                           </p:stCondLst>
@@ -18877,14 +18776,14 @@
                                 </p:cTn>
                               </p:par>
                               <p:par>
-                                <p:cTn id="23" presetID="1" presetClass="entr" presetSubtype="0" fill="hold" nodeType="withEffect">
+                                <p:cTn id="25" presetID="1" presetClass="entr" presetSubtype="0" fill="hold" nodeType="withEffect">
                                   <p:stCondLst>
                                     <p:cond delay="0"/>
                                   </p:stCondLst>
                                   <p:childTnLst>
                                     <p:set>
                                       <p:cBhvr>
-                                        <p:cTn id="24" dur="1" fill="hold">
+                                        <p:cTn id="26" dur="1" fill="hold">
                                           <p:stCondLst>
                                             <p:cond delay="0"/>
                                           </p:stCondLst>
@@ -18914,26 +18813,26 @@
                     </p:cTn>
                   </p:par>
                   <p:par>
-                    <p:cTn id="25" fill="hold">
+                    <p:cTn id="27" fill="hold">
                       <p:stCondLst>
                         <p:cond delay="indefinite"/>
                       </p:stCondLst>
                       <p:childTnLst>
                         <p:par>
-                          <p:cTn id="26" fill="hold">
+                          <p:cTn id="28" fill="hold">
                             <p:stCondLst>
                               <p:cond delay="0"/>
                             </p:stCondLst>
                             <p:childTnLst>
                               <p:par>
-                                <p:cTn id="27" presetID="1" presetClass="entr" presetSubtype="0" fill="hold" nodeType="clickEffect">
+                                <p:cTn id="29" presetID="1" presetClass="entr" presetSubtype="0" fill="hold" nodeType="clickEffect">
                                   <p:stCondLst>
                                     <p:cond delay="0"/>
                                   </p:stCondLst>
                                   <p:childTnLst>
                                     <p:set>
                                       <p:cBhvr>
-                                        <p:cTn id="28" dur="1" fill="hold">
+                                        <p:cTn id="30" dur="1" fill="hold">
                                           <p:stCondLst>
                                             <p:cond delay="0"/>
                                           </p:stCondLst>
@@ -18957,38 +18856,7 @@
                                 </p:cTn>
                               </p:par>
                               <p:par>
-                                <p:cTn id="29" presetID="1" presetClass="entr" presetSubtype="0" fill="hold" nodeType="withEffect">
-                                  <p:stCondLst>
-                                    <p:cond delay="0"/>
-                                  </p:stCondLst>
-                                  <p:childTnLst>
-                                    <p:set>
-                                      <p:cBhvr>
-                                        <p:cTn id="30" dur="1" fill="hold">
-                                          <p:stCondLst>
-                                            <p:cond delay="0"/>
-                                          </p:stCondLst>
-                                        </p:cTn>
-                                        <p:tgtEl>
-                                          <p:spTgt spid="4">
-                                            <p:txEl>
-                                              <p:pRg st="12" end="12"/>
-                                            </p:txEl>
-                                          </p:spTgt>
-                                        </p:tgtEl>
-                                        <p:attrNameLst>
-                                          <p:attrName>style.visibility</p:attrName>
-                                        </p:attrNameLst>
-                                      </p:cBhvr>
-                                      <p:to>
-                                        <p:strVal val="visible"/>
-                                      </p:to>
-                                    </p:set>
-                                  </p:childTnLst>
-                                </p:cTn>
-                              </p:par>
-                              <p:par>
-                                <p:cTn id="31" presetID="1" presetClass="entr" presetSubtype="0" fill="hold" grpId="0" nodeType="withEffect">
+                                <p:cTn id="31" presetID="1" presetClass="entr" presetSubtype="0" fill="hold" nodeType="withEffect">
                                   <p:stCondLst>
                                     <p:cond delay="0"/>
                                   </p:stCondLst>
@@ -19001,7 +18869,11 @@
                                           </p:stCondLst>
                                         </p:cTn>
                                         <p:tgtEl>
-                                          <p:spTgt spid="8"/>
+                                          <p:spTgt spid="4">
+                                            <p:txEl>
+                                              <p:pRg st="12" end="12"/>
+                                            </p:txEl>
+                                          </p:spTgt>
                                         </p:tgtEl>
                                         <p:attrNameLst>
                                           <p:attrName>style.visibility</p:attrName>
@@ -19104,7 +18976,7 @@
         <p:spPr>
           <a:xfrm>
             <a:off x="457199" y="1126324"/>
-            <a:ext cx="8614554" cy="5847755"/>
+            <a:ext cx="8614554" cy="5170646"/>
           </a:xfrm>
           <a:prstGeom prst="rect">
             <a:avLst/>
@@ -19122,21 +18994,7 @@
                 <a:latin typeface="Monaco"/>
                 <a:cs typeface="Monaco"/>
               </a:rPr>
-              <a:t>s1 </a:t>
-            </a:r>
-            <a:r>
-              <a:rPr lang="en-US" sz="2200" dirty="0" smtClean="0">
-                <a:latin typeface="Monaco"/>
-                <a:cs typeface="Monaco"/>
-              </a:rPr>
-              <a:t>= </a:t>
-            </a:r>
-            <a:r>
-              <a:rPr lang="en-US" sz="2200" dirty="0" smtClean="0">
-                <a:latin typeface="Monaco"/>
-                <a:cs typeface="Monaco"/>
-              </a:rPr>
-              <a:t>"python"</a:t>
+              <a:t>s1 = "python"</a:t>
             </a:r>
           </a:p>
           <a:p>
@@ -19443,41 +19301,6 @@
               <a:latin typeface="Monaco"/>
               <a:cs typeface="Monaco"/>
             </a:endParaRPr>
-          </a:p>
-          <a:p>
-            <a:r>
-              <a:rPr lang="en-US" sz="2200" dirty="0" smtClean="0">
-                <a:latin typeface="Monaco"/>
-                <a:cs typeface="Monaco"/>
-              </a:rPr>
-              <a:t>print(s1)</a:t>
-            </a:r>
-          </a:p>
-          <a:p>
-            <a:r>
-              <a:rPr lang="en-US" sz="2200" dirty="0">
-                <a:solidFill>
-                  <a:schemeClr val="bg1">
-                    <a:lumMod val="65000"/>
-                  </a:schemeClr>
-                </a:solidFill>
-                <a:latin typeface="Monaco"/>
-                <a:cs typeface="Monaco"/>
-              </a:rPr>
-              <a:t>	</a:t>
-            </a:r>
-            <a:r>
-              <a:rPr lang="en-US" sz="2200" dirty="0" smtClean="0">
-                <a:solidFill>
-                  <a:schemeClr val="bg1">
-                    <a:lumMod val="65000"/>
-                  </a:schemeClr>
-                </a:solidFill>
-                <a:latin typeface="Monaco"/>
-                <a:cs typeface="Monaco"/>
-              </a:rPr>
-              <a:t>'python'</a:t>
-            </a:r>
           </a:p>
           <a:p>
             <a:r>
@@ -19549,7 +19372,172 @@
   <p:timing>
     <p:tnLst>
       <p:par>
-        <p:cTn id="1" dur="indefinite" restart="never" nodeType="tmRoot"/>
+        <p:cTn id="1" dur="indefinite" restart="never" nodeType="tmRoot">
+          <p:childTnLst>
+            <p:seq concurrent="1" nextAc="seek">
+              <p:cTn id="2" dur="indefinite" nodeType="mainSeq">
+                <p:childTnLst>
+                  <p:par>
+                    <p:cTn id="3" fill="hold">
+                      <p:stCondLst>
+                        <p:cond delay="indefinite"/>
+                      </p:stCondLst>
+                      <p:childTnLst>
+                        <p:par>
+                          <p:cTn id="4" fill="hold">
+                            <p:stCondLst>
+                              <p:cond delay="0"/>
+                            </p:stCondLst>
+                            <p:childTnLst>
+                              <p:par>
+                                <p:cTn id="5" presetID="1" presetClass="entr" presetSubtype="0" fill="hold" nodeType="clickEffect">
+                                  <p:stCondLst>
+                                    <p:cond delay="0"/>
+                                  </p:stCondLst>
+                                  <p:childTnLst>
+                                    <p:set>
+                                      <p:cBhvr>
+                                        <p:cTn id="6" dur="1" fill="hold">
+                                          <p:stCondLst>
+                                            <p:cond delay="0"/>
+                                          </p:stCondLst>
+                                        </p:cTn>
+                                        <p:tgtEl>
+                                          <p:spTgt spid="4">
+                                            <p:txEl>
+                                              <p:pRg st="11" end="11"/>
+                                            </p:txEl>
+                                          </p:spTgt>
+                                        </p:tgtEl>
+                                        <p:attrNameLst>
+                                          <p:attrName>style.visibility</p:attrName>
+                                        </p:attrNameLst>
+                                      </p:cBhvr>
+                                      <p:to>
+                                        <p:strVal val="visible"/>
+                                      </p:to>
+                                    </p:set>
+                                  </p:childTnLst>
+                                </p:cTn>
+                              </p:par>
+                              <p:par>
+                                <p:cTn id="7" presetID="1" presetClass="entr" presetSubtype="0" fill="hold" nodeType="withEffect">
+                                  <p:stCondLst>
+                                    <p:cond delay="0"/>
+                                  </p:stCondLst>
+                                  <p:childTnLst>
+                                    <p:set>
+                                      <p:cBhvr>
+                                        <p:cTn id="8" dur="1" fill="hold">
+                                          <p:stCondLst>
+                                            <p:cond delay="0"/>
+                                          </p:stCondLst>
+                                        </p:cTn>
+                                        <p:tgtEl>
+                                          <p:spTgt spid="4">
+                                            <p:txEl>
+                                              <p:pRg st="12" end="12"/>
+                                            </p:txEl>
+                                          </p:spTgt>
+                                        </p:tgtEl>
+                                        <p:attrNameLst>
+                                          <p:attrName>style.visibility</p:attrName>
+                                        </p:attrNameLst>
+                                      </p:cBhvr>
+                                      <p:to>
+                                        <p:strVal val="visible"/>
+                                      </p:to>
+                                    </p:set>
+                                  </p:childTnLst>
+                                </p:cTn>
+                              </p:par>
+                              <p:par>
+                                <p:cTn id="9" presetID="1" presetClass="entr" presetSubtype="0" fill="hold" nodeType="withEffect">
+                                  <p:stCondLst>
+                                    <p:cond delay="0"/>
+                                  </p:stCondLst>
+                                  <p:childTnLst>
+                                    <p:set>
+                                      <p:cBhvr>
+                                        <p:cTn id="10" dur="1" fill="hold">
+                                          <p:stCondLst>
+                                            <p:cond delay="0"/>
+                                          </p:stCondLst>
+                                        </p:cTn>
+                                        <p:tgtEl>
+                                          <p:spTgt spid="4">
+                                            <p:txEl>
+                                              <p:pRg st="13" end="13"/>
+                                            </p:txEl>
+                                          </p:spTgt>
+                                        </p:tgtEl>
+                                        <p:attrNameLst>
+                                          <p:attrName>style.visibility</p:attrName>
+                                        </p:attrNameLst>
+                                      </p:cBhvr>
+                                      <p:to>
+                                        <p:strVal val="visible"/>
+                                      </p:to>
+                                    </p:set>
+                                  </p:childTnLst>
+                                </p:cTn>
+                              </p:par>
+                              <p:par>
+                                <p:cTn id="11" presetID="1" presetClass="entr" presetSubtype="0" fill="hold" nodeType="withEffect">
+                                  <p:stCondLst>
+                                    <p:cond delay="0"/>
+                                  </p:stCondLst>
+                                  <p:childTnLst>
+                                    <p:set>
+                                      <p:cBhvr>
+                                        <p:cTn id="12" dur="1" fill="hold">
+                                          <p:stCondLst>
+                                            <p:cond delay="0"/>
+                                          </p:stCondLst>
+                                        </p:cTn>
+                                        <p:tgtEl>
+                                          <p:spTgt spid="4">
+                                            <p:txEl>
+                                              <p:pRg st="14" end="14"/>
+                                            </p:txEl>
+                                          </p:spTgt>
+                                        </p:tgtEl>
+                                        <p:attrNameLst>
+                                          <p:attrName>style.visibility</p:attrName>
+                                        </p:attrNameLst>
+                                      </p:cBhvr>
+                                      <p:to>
+                                        <p:strVal val="visible"/>
+                                      </p:to>
+                                    </p:set>
+                                  </p:childTnLst>
+                                </p:cTn>
+                              </p:par>
+                            </p:childTnLst>
+                          </p:cTn>
+                        </p:par>
+                      </p:childTnLst>
+                    </p:cTn>
+                  </p:par>
+                </p:childTnLst>
+              </p:cTn>
+              <p:prevCondLst>
+                <p:cond evt="onPrev" delay="0">
+                  <p:tgtEl>
+                    <p:sldTgt/>
+                  </p:tgtEl>
+                </p:cond>
+              </p:prevCondLst>
+              <p:nextCondLst>
+                <p:cond evt="onNext" delay="0">
+                  <p:tgtEl>
+                    <p:sldTgt/>
+                  </p:tgtEl>
+                </p:cond>
+              </p:nextCondLst>
+            </p:seq>
+          </p:childTnLst>
+        </p:cTn>
       </p:par>
     </p:tnLst>
   </p:timing>
@@ -19629,6 +19617,13 @@
   <p:clrMapOvr>
     <a:masterClrMapping/>
   </p:clrMapOvr>
+  <p:timing>
+    <p:tnLst>
+      <p:par>
+        <p:cTn id="1" dur="indefinite" restart="never" nodeType="tmRoot"/>
+      </p:par>
+    </p:tnLst>
+  </p:timing>
 </p:sld>
 </file>
 
@@ -19666,11 +19661,7 @@
           <a:p>
             <a:r>
               <a:rPr lang="en-US" dirty="0" smtClean="0"/>
-              <a:t>Python </a:t>
-            </a:r>
-            <a:r>
-              <a:rPr lang="en-US" dirty="0" smtClean="0"/>
-              <a:t>lists</a:t>
+              <a:t>Python lists</a:t>
             </a:r>
             <a:br>
               <a:rPr lang="en-US" dirty="0" smtClean="0"/>
@@ -19756,31 +19747,8 @@
                 <a:latin typeface="Monaco"/>
                 <a:cs typeface="Monaco"/>
               </a:rPr>
-              <a:t># Define </a:t>
-            </a:r>
-            <a:r>
-              <a:rPr lang="en-US" sz="2200" dirty="0" smtClean="0">
-                <a:solidFill>
-                  <a:schemeClr val="accent3">
-                    <a:lumMod val="60000"/>
-                    <a:lumOff val="40000"/>
-                  </a:schemeClr>
-                </a:solidFill>
-                <a:latin typeface="Monaco"/>
-                <a:cs typeface="Monaco"/>
-              </a:rPr>
-              <a:t>some lists</a:t>
-            </a:r>
-            <a:endParaRPr lang="en-US" sz="2200" dirty="0" smtClean="0">
-              <a:solidFill>
-                <a:schemeClr val="accent3">
-                  <a:lumMod val="60000"/>
-                  <a:lumOff val="40000"/>
-                </a:schemeClr>
-              </a:solidFill>
-              <a:latin typeface="Monaco"/>
-              <a:cs typeface="Monaco"/>
-            </a:endParaRPr>
+              <a:t># Define some lists</a:t>
+            </a:r>
           </a:p>
           <a:p>
             <a:r>
@@ -19803,14 +19771,7 @@
                 <a:latin typeface="Monaco"/>
                 <a:cs typeface="Monaco"/>
               </a:rPr>
-              <a:t>b </a:t>
-            </a:r>
-            <a:r>
-              <a:rPr lang="en-US" sz="2200" dirty="0" smtClean="0">
-                <a:latin typeface="Monaco"/>
-                <a:cs typeface="Monaco"/>
-              </a:rPr>
-              <a:t>= [1, 3.1, -5, 7, 9.001]</a:t>
+              <a:t>b = [1, 3.1, -5, 7, 9.001]</a:t>
             </a:r>
           </a:p>
           <a:p>
@@ -19868,14 +19829,7 @@
                 <a:latin typeface="Monaco"/>
                 <a:cs typeface="Monaco"/>
               </a:rPr>
-              <a:t>d </a:t>
-            </a:r>
-            <a:r>
-              <a:rPr lang="en-US" sz="2200" dirty="0" smtClean="0">
-                <a:latin typeface="Monaco"/>
-                <a:cs typeface="Monaco"/>
-              </a:rPr>
-              <a:t>= [ [1, 2, 3], [11, 22, 33], [7.55, -9] ]</a:t>
+              <a:t>d = [ [1, 2, 3], [11, 22, 33], [7.55, -9] ]</a:t>
             </a:r>
             <a:endParaRPr lang="en-US" sz="2200" dirty="0">
               <a:latin typeface="Monaco"/>
@@ -19940,7 +19894,15 @@
                   <a:srgbClr val="DC5924"/>
                 </a:solidFill>
               </a:rPr>
-              <a:t> </a:t>
+              <a:t> that comprise the </a:t>
+            </a:r>
+            <a:r>
+              <a:rPr lang="en-US" sz="2200" i="1" dirty="0" smtClean="0">
+                <a:solidFill>
+                  <a:srgbClr val="DC5924"/>
+                </a:solidFill>
+              </a:rPr>
+              <a:t>items</a:t>
             </a:r>
             <a:r>
               <a:rPr lang="en-US" sz="2200" dirty="0" smtClean="0">
@@ -19948,39 +19910,7 @@
                   <a:srgbClr val="DC5924"/>
                 </a:solidFill>
               </a:rPr>
-              <a:t>that comprise the </a:t>
-            </a:r>
-            <a:r>
-              <a:rPr lang="en-US" sz="2200" i="1" dirty="0" smtClean="0">
-                <a:solidFill>
-                  <a:srgbClr val="DC5924"/>
-                </a:solidFill>
-              </a:rPr>
-              <a:t>items</a:t>
-            </a:r>
-            <a:r>
-              <a:rPr lang="en-US" sz="2200" dirty="0" smtClean="0">
-                <a:solidFill>
-                  <a:srgbClr val="DC5924"/>
-                </a:solidFill>
-              </a:rPr>
-              <a:t> of </a:t>
-            </a:r>
-            <a:r>
-              <a:rPr lang="en-US" sz="2200" dirty="0" smtClean="0">
-                <a:solidFill>
-                  <a:srgbClr val="DC5924"/>
-                </a:solidFill>
-              </a:rPr>
-              <a:t>these </a:t>
-            </a:r>
-            <a:r>
-              <a:rPr lang="en-US" sz="2200" dirty="0" smtClean="0">
-                <a:solidFill>
-                  <a:srgbClr val="DC5924"/>
-                </a:solidFill>
-              </a:rPr>
-              <a:t>lists?</a:t>
+              <a:t> of these lists?</a:t>
             </a:r>
             <a:endParaRPr lang="en-US" sz="2200" dirty="0">
               <a:solidFill>
@@ -20115,11 +20045,7 @@
           <a:p>
             <a:r>
               <a:rPr lang="en-US" dirty="0" smtClean="0"/>
-              <a:t>indexing in </a:t>
-            </a:r>
-            <a:r>
-              <a:rPr lang="en-US" dirty="0" smtClean="0"/>
-              <a:t>python</a:t>
+              <a:t>indexing in python</a:t>
             </a:r>
             <a:br>
               <a:rPr lang="en-US" dirty="0" smtClean="0"/>
@@ -20197,14 +20123,6 @@
               </a:rPr>
               <a:t> Indexing starts </a:t>
             </a:r>
-            <a:endParaRPr lang="en-US" sz="2200" b="1" dirty="0" smtClean="0">
-              <a:solidFill>
-                <a:schemeClr val="accent2"/>
-              </a:solidFill>
-              <a:latin typeface="Monaco"/>
-              <a:cs typeface="Monaco"/>
-              <a:sym typeface="Wingdings"/>
-            </a:endParaRPr>
           </a:p>
           <a:p>
             <a:r>
@@ -20227,29 +20145,7 @@
                 <a:cs typeface="Monaco"/>
                 <a:sym typeface="Wingdings"/>
               </a:rPr>
-              <a:t>                                       </a:t>
-            </a:r>
-            <a:r>
-              <a:rPr lang="en-US" sz="2200" b="1" dirty="0" smtClean="0">
-                <a:solidFill>
-                  <a:schemeClr val="accent2"/>
-                </a:solidFill>
-                <a:latin typeface="Monaco"/>
-                <a:cs typeface="Monaco"/>
-                <a:sym typeface="Wingdings"/>
-              </a:rPr>
-              <a:t>from </a:t>
-            </a:r>
-            <a:r>
-              <a:rPr lang="en-US" sz="2200" b="1" dirty="0" smtClean="0">
-                <a:solidFill>
-                  <a:schemeClr val="accent2"/>
-                </a:solidFill>
-                <a:latin typeface="Monaco"/>
-                <a:cs typeface="Monaco"/>
-                <a:sym typeface="Wingdings"/>
-              </a:rPr>
-              <a:t>0!</a:t>
+              <a:t>                                       from 0!</a:t>
             </a:r>
             <a:endParaRPr lang="en-US" sz="2200" b="1" dirty="0" smtClean="0">
               <a:solidFill>
@@ -20330,13 +20226,6 @@
               </a:rPr>
               <a:t>print(d[1])</a:t>
             </a:r>
-            <a:endParaRPr lang="en-US" sz="2200" dirty="0" smtClean="0">
-              <a:solidFill>
-                <a:srgbClr val="000000"/>
-              </a:solidFill>
-              <a:latin typeface="Monaco"/>
-              <a:cs typeface="Monaco"/>
-            </a:endParaRPr>
           </a:p>
           <a:p>
             <a:r>
@@ -20422,10 +20311,6 @@
               </a:rPr>
               <a:t>print(d[1:4])</a:t>
             </a:r>
-            <a:endParaRPr lang="en-US" sz="2200" dirty="0" smtClean="0">
-              <a:latin typeface="Monaco"/>
-              <a:cs typeface="Monaco"/>
-            </a:endParaRPr>
           </a:p>
           <a:p>
             <a:r>
@@ -20536,27 +20421,7 @@
                 <a:latin typeface="Monaco"/>
                 <a:cs typeface="Monaco"/>
               </a:rPr>
-              <a:t>print(d</a:t>
-            </a:r>
-            <a:r>
-              <a:rPr lang="en-US" sz="2200" dirty="0" smtClean="0">
-                <a:solidFill>
-                  <a:srgbClr val="000000"/>
-                </a:solidFill>
-                <a:latin typeface="Monaco"/>
-                <a:cs typeface="Monaco"/>
-              </a:rPr>
-              <a:t>[:5</a:t>
-            </a:r>
-            <a:r>
-              <a:rPr lang="en-US" sz="2200" dirty="0" smtClean="0">
-                <a:solidFill>
-                  <a:srgbClr val="000000"/>
-                </a:solidFill>
-                <a:latin typeface="Monaco"/>
-                <a:cs typeface="Monaco"/>
-              </a:rPr>
-              <a:t>])  </a:t>
+              <a:t>print(d[:5])  </a:t>
             </a:r>
             <a:r>
               <a:rPr lang="en-US" sz="2200" dirty="0" smtClean="0">
@@ -21308,6 +21173,9 @@
               <a:rPr lang="en-US" dirty="0" smtClean="0"/>
               <a:t>indexing in python</a:t>
             </a:r>
+            <a:br>
+              <a:rPr lang="en-US" dirty="0" smtClean="0"/>
+            </a:br>
             <a:endParaRPr lang="en-US" dirty="0"/>
           </a:p>
         </p:txBody>
@@ -21320,8 +21188,8 @@
         </p:nvSpPr>
         <p:spPr>
           <a:xfrm>
-            <a:off x="457199" y="1658319"/>
-            <a:ext cx="9729791" cy="5170646"/>
+            <a:off x="457199" y="1215406"/>
+            <a:ext cx="9729791" cy="6524863"/>
           </a:xfrm>
           <a:prstGeom prst="rect">
             <a:avLst/>
@@ -21346,77 +21214,7 @@
                 <a:latin typeface="Monaco"/>
                 <a:cs typeface="Monaco"/>
               </a:rPr>
-              <a:t> = [1</a:t>
-            </a:r>
-            <a:r>
-              <a:rPr lang="en-US" sz="2200" dirty="0" smtClean="0">
-                <a:latin typeface="Monaco"/>
-                <a:cs typeface="Monaco"/>
-              </a:rPr>
-              <a:t>, </a:t>
-            </a:r>
-            <a:r>
-              <a:rPr lang="en-US" sz="2200" dirty="0" smtClean="0">
-                <a:latin typeface="Monaco"/>
-                <a:cs typeface="Monaco"/>
-              </a:rPr>
-              <a:t>3</a:t>
-            </a:r>
-            <a:r>
-              <a:rPr lang="en-US" sz="2200" dirty="0" smtClean="0">
-                <a:latin typeface="Monaco"/>
-                <a:cs typeface="Monaco"/>
-              </a:rPr>
-              <a:t>, </a:t>
-            </a:r>
-            <a:r>
-              <a:rPr lang="en-US" sz="2200" dirty="0" smtClean="0">
-                <a:latin typeface="Monaco"/>
-                <a:cs typeface="Monaco"/>
-              </a:rPr>
-              <a:t>5</a:t>
-            </a:r>
-            <a:r>
-              <a:rPr lang="en-US" sz="2200" dirty="0" smtClean="0">
-                <a:latin typeface="Monaco"/>
-                <a:cs typeface="Monaco"/>
-              </a:rPr>
-              <a:t>, </a:t>
-            </a:r>
-            <a:r>
-              <a:rPr lang="en-US" sz="2200" dirty="0" smtClean="0">
-                <a:latin typeface="Monaco"/>
-                <a:cs typeface="Monaco"/>
-              </a:rPr>
-              <a:t>7</a:t>
-            </a:r>
-            <a:r>
-              <a:rPr lang="en-US" sz="2200" dirty="0" smtClean="0">
-                <a:latin typeface="Monaco"/>
-                <a:cs typeface="Monaco"/>
-              </a:rPr>
-              <a:t>, </a:t>
-            </a:r>
-            <a:r>
-              <a:rPr lang="en-US" sz="2200" dirty="0" smtClean="0">
-                <a:latin typeface="Monaco"/>
-                <a:cs typeface="Monaco"/>
-              </a:rPr>
-              <a:t>9, </a:t>
-            </a:r>
-            <a:r>
-              <a:rPr lang="en-US" sz="2200" dirty="0" smtClean="0">
-                <a:latin typeface="Monaco"/>
-                <a:cs typeface="Monaco"/>
-              </a:rPr>
-              <a:t>11, </a:t>
-            </a:r>
-            <a:r>
-              <a:rPr lang="en-US" sz="2200" dirty="0" smtClean="0">
-                <a:latin typeface="Monaco"/>
-                <a:cs typeface="Monaco"/>
-              </a:rPr>
-              <a:t>13]</a:t>
+              <a:t> = [1, 3, 5, 7, 9, 11, 13]</a:t>
             </a:r>
           </a:p>
           <a:p>
@@ -21438,7 +21236,7 @@
                 <a:latin typeface="Monaco"/>
                 <a:cs typeface="Monaco"/>
               </a:rPr>
-              <a:t>    0 </a:t>
+              <a:t>    0  1  2  3  4   5   6   </a:t>
             </a:r>
             <a:r>
               <a:rPr lang="en-US" sz="2200" b="1" dirty="0" smtClean="0">
@@ -21447,70 +21245,9 @@
                 </a:solidFill>
                 <a:latin typeface="Monaco"/>
                 <a:cs typeface="Monaco"/>
-              </a:rPr>
-              <a:t> 1  2  </a:t>
-            </a:r>
-            <a:r>
-              <a:rPr lang="en-US" sz="2200" b="1" dirty="0" smtClean="0">
-                <a:solidFill>
-                  <a:srgbClr val="F5C201"/>
-                </a:solidFill>
-                <a:latin typeface="Monaco"/>
-                <a:cs typeface="Monaco"/>
-              </a:rPr>
-              <a:t>3 </a:t>
-            </a:r>
-            <a:r>
-              <a:rPr lang="en-US" sz="2200" b="1" dirty="0" smtClean="0">
-                <a:solidFill>
-                  <a:srgbClr val="F5C201"/>
-                </a:solidFill>
-                <a:latin typeface="Monaco"/>
-                <a:cs typeface="Monaco"/>
-              </a:rPr>
-              <a:t> </a:t>
-            </a:r>
-            <a:r>
-              <a:rPr lang="en-US" sz="2200" b="1" dirty="0" smtClean="0">
-                <a:solidFill>
-                  <a:srgbClr val="F5C201"/>
-                </a:solidFill>
-                <a:latin typeface="Monaco"/>
-                <a:cs typeface="Monaco"/>
-              </a:rPr>
-              <a:t>4 </a:t>
-            </a:r>
-            <a:r>
-              <a:rPr lang="en-US" sz="2200" b="1" dirty="0" smtClean="0">
-                <a:solidFill>
-                  <a:srgbClr val="F5C201"/>
-                </a:solidFill>
-                <a:latin typeface="Monaco"/>
-                <a:cs typeface="Monaco"/>
-              </a:rPr>
-              <a:t>  5   6   </a:t>
-            </a:r>
-            <a:r>
-              <a:rPr lang="en-US" sz="2200" b="1" dirty="0" smtClean="0">
-                <a:solidFill>
-                  <a:srgbClr val="F5C201"/>
-                </a:solidFill>
-                <a:latin typeface="Monaco"/>
-                <a:cs typeface="Monaco"/>
                 <a:sym typeface="Wingdings"/>
               </a:rPr>
-              <a:t> </a:t>
-            </a:r>
-            <a:r>
-              <a:rPr lang="en-US" sz="2200" b="1" dirty="0" smtClean="0">
-                <a:solidFill>
-                  <a:srgbClr val="F5C201"/>
-                </a:solidFill>
-                <a:latin typeface="Monaco"/>
-                <a:cs typeface="Monaco"/>
-                <a:sym typeface="Wingdings"/>
-              </a:rPr>
-              <a:t>"Regular" indexing</a:t>
+              <a:t> "Regular" indexing</a:t>
             </a:r>
             <a:endParaRPr lang="en-US" sz="2200" b="1" dirty="0" smtClean="0">
               <a:solidFill>
@@ -21529,107 +21266,7 @@
                 <a:latin typeface="Monaco"/>
                 <a:cs typeface="Monaco"/>
               </a:rPr>
-              <a:t>    -</a:t>
-            </a:r>
-            <a:r>
-              <a:rPr lang="en-US" sz="2200" dirty="0" smtClean="0">
-                <a:solidFill>
-                  <a:srgbClr val="D1282E"/>
-                </a:solidFill>
-                <a:latin typeface="Monaco"/>
-                <a:cs typeface="Monaco"/>
-              </a:rPr>
-              <a:t>7 </a:t>
-            </a:r>
-            <a:r>
-              <a:rPr lang="en-US" sz="2200" dirty="0" smtClean="0">
-                <a:solidFill>
-                  <a:srgbClr val="D1282E"/>
-                </a:solidFill>
-                <a:latin typeface="Monaco"/>
-                <a:cs typeface="Monaco"/>
-              </a:rPr>
-              <a:t>-</a:t>
-            </a:r>
-            <a:r>
-              <a:rPr lang="en-US" sz="2200" dirty="0" smtClean="0">
-                <a:solidFill>
-                  <a:srgbClr val="D1282E"/>
-                </a:solidFill>
-                <a:latin typeface="Monaco"/>
-                <a:cs typeface="Monaco"/>
-              </a:rPr>
-              <a:t>6 </a:t>
-            </a:r>
-            <a:r>
-              <a:rPr lang="en-US" sz="2200" dirty="0" smtClean="0">
-                <a:solidFill>
-                  <a:srgbClr val="D1282E"/>
-                </a:solidFill>
-                <a:latin typeface="Monaco"/>
-                <a:cs typeface="Monaco"/>
-              </a:rPr>
-              <a:t>-5 </a:t>
-            </a:r>
-            <a:r>
-              <a:rPr lang="en-US" sz="2200" dirty="0" smtClean="0">
-                <a:solidFill>
-                  <a:srgbClr val="D1282E"/>
-                </a:solidFill>
-                <a:latin typeface="Monaco"/>
-                <a:cs typeface="Monaco"/>
-              </a:rPr>
-              <a:t>-</a:t>
-            </a:r>
-            <a:r>
-              <a:rPr lang="en-US" sz="2200" dirty="0" smtClean="0">
-                <a:solidFill>
-                  <a:srgbClr val="D1282E"/>
-                </a:solidFill>
-                <a:latin typeface="Monaco"/>
-                <a:cs typeface="Monaco"/>
-              </a:rPr>
-              <a:t>4 </a:t>
-            </a:r>
-            <a:r>
-              <a:rPr lang="en-US" sz="2200" dirty="0" smtClean="0">
-                <a:solidFill>
-                  <a:srgbClr val="D1282E"/>
-                </a:solidFill>
-                <a:latin typeface="Monaco"/>
-                <a:cs typeface="Monaco"/>
-              </a:rPr>
-              <a:t>-</a:t>
-            </a:r>
-            <a:r>
-              <a:rPr lang="en-US" sz="2200" dirty="0" smtClean="0">
-                <a:solidFill>
-                  <a:srgbClr val="D1282E"/>
-                </a:solidFill>
-                <a:latin typeface="Monaco"/>
-                <a:cs typeface="Monaco"/>
-              </a:rPr>
-              <a:t>3  -2  </a:t>
-            </a:r>
-            <a:r>
-              <a:rPr lang="en-US" sz="2200" dirty="0" smtClean="0">
-                <a:solidFill>
-                  <a:srgbClr val="D1282E"/>
-                </a:solidFill>
-                <a:latin typeface="Monaco"/>
-                <a:cs typeface="Monaco"/>
-              </a:rPr>
-              <a:t>-</a:t>
-            </a:r>
-            <a:r>
-              <a:rPr lang="en-US" sz="2200" dirty="0" smtClean="0">
-                <a:solidFill>
-                  <a:srgbClr val="D1282E"/>
-                </a:solidFill>
-                <a:latin typeface="Monaco"/>
-                <a:cs typeface="Monaco"/>
-              </a:rPr>
-              <a:t>1   </a:t>
+              <a:t>    -7 -6 -5 -4 -3  -2  -1   </a:t>
             </a:r>
             <a:r>
               <a:rPr lang="en-US" sz="2200" dirty="0" smtClean="0">
@@ -21719,31 +21356,41 @@
                 <a:latin typeface="Monaco"/>
                 <a:cs typeface="Monaco"/>
               </a:rPr>
-              <a:t>print(d</a:t>
+              <a:t>print(d[-1])</a:t>
+            </a:r>
+          </a:p>
+          <a:p>
+            <a:r>
+              <a:rPr lang="en-US" sz="2200" dirty="0">
+                <a:solidFill>
+                  <a:schemeClr val="bg1">
+                    <a:lumMod val="65000"/>
+                  </a:schemeClr>
+                </a:solidFill>
+                <a:latin typeface="Monaco"/>
+                <a:cs typeface="Monaco"/>
+              </a:rPr>
+              <a:t>	</a:t>
             </a:r>
             <a:r>
               <a:rPr lang="en-US" sz="2200" dirty="0" smtClean="0">
                 <a:solidFill>
-                  <a:srgbClr val="000000"/>
-                </a:solidFill>
-                <a:latin typeface="Monaco"/>
-                <a:cs typeface="Monaco"/>
-              </a:rPr>
-              <a:t>[-1</a:t>
-            </a:r>
-            <a:r>
-              <a:rPr lang="en-US" sz="2200" dirty="0" smtClean="0">
-                <a:solidFill>
-                  <a:srgbClr val="000000"/>
-                </a:solidFill>
-                <a:latin typeface="Monaco"/>
-                <a:cs typeface="Monaco"/>
-              </a:rPr>
-              <a:t>])</a:t>
-            </a:r>
+                  <a:schemeClr val="bg1">
+                    <a:lumMod val="65000"/>
+                  </a:schemeClr>
+                </a:solidFill>
+                <a:latin typeface="Monaco"/>
+                <a:cs typeface="Monaco"/>
+              </a:rPr>
+              <a:t>13</a:t>
+            </a:r>
+          </a:p>
+          <a:p>
             <a:endParaRPr lang="en-US" sz="2200" dirty="0" smtClean="0">
               <a:solidFill>
-                <a:srgbClr val="000000"/>
+                <a:schemeClr val="bg1">
+                  <a:lumMod val="65000"/>
+                </a:schemeClr>
               </a:solidFill>
               <a:latin typeface="Monaco"/>
               <a:cs typeface="Monaco"/>
@@ -21753,6 +21400,95 @@
             <a:r>
               <a:rPr lang="en-US" sz="2200" dirty="0">
                 <a:solidFill>
+                  <a:schemeClr val="accent3">
+                    <a:lumMod val="60000"/>
+                    <a:lumOff val="40000"/>
+                  </a:schemeClr>
+                </a:solidFill>
+                <a:latin typeface="Monaco"/>
+                <a:cs typeface="Monaco"/>
+              </a:rPr>
+              <a:t># Index the last</a:t>
+            </a:r>
+            <a:r>
+              <a:rPr lang="en-US" sz="2200" i="1" dirty="0">
+                <a:solidFill>
+                  <a:schemeClr val="accent3">
+                    <a:lumMod val="60000"/>
+                    <a:lumOff val="40000"/>
+                  </a:schemeClr>
+                </a:solidFill>
+                <a:latin typeface="Monaco"/>
+                <a:cs typeface="Monaco"/>
+              </a:rPr>
+              <a:t> </a:t>
+            </a:r>
+            <a:r>
+              <a:rPr lang="en-US" sz="2200" i="1" dirty="0" smtClean="0">
+                <a:solidFill>
+                  <a:schemeClr val="accent3">
+                    <a:lumMod val="60000"/>
+                    <a:lumOff val="40000"/>
+                  </a:schemeClr>
+                </a:solidFill>
+                <a:latin typeface="Monaco"/>
+                <a:cs typeface="Monaco"/>
+              </a:rPr>
+              <a:t>2 </a:t>
+            </a:r>
+            <a:r>
+              <a:rPr lang="en-US" sz="2200" dirty="0" smtClean="0">
+                <a:solidFill>
+                  <a:schemeClr val="accent3">
+                    <a:lumMod val="60000"/>
+                    <a:lumOff val="40000"/>
+                  </a:schemeClr>
+                </a:solidFill>
+                <a:latin typeface="Monaco"/>
+                <a:cs typeface="Monaco"/>
+              </a:rPr>
+              <a:t>entries </a:t>
+            </a:r>
+            <a:r>
+              <a:rPr lang="en-US" sz="2200" dirty="0">
+                <a:solidFill>
+                  <a:schemeClr val="accent3">
+                    <a:lumMod val="60000"/>
+                    <a:lumOff val="40000"/>
+                  </a:schemeClr>
+                </a:solidFill>
+                <a:latin typeface="Monaco"/>
+                <a:cs typeface="Monaco"/>
+              </a:rPr>
+              <a:t>in d using brackets []</a:t>
+            </a:r>
+          </a:p>
+          <a:p>
+            <a:r>
+              <a:rPr lang="en-US" sz="2200" dirty="0">
+                <a:solidFill>
+                  <a:srgbClr val="000000"/>
+                </a:solidFill>
+                <a:latin typeface="Monaco"/>
+                <a:cs typeface="Monaco"/>
+              </a:rPr>
+              <a:t>print(d</a:t>
+            </a:r>
+            <a:r>
+              <a:rPr lang="en-US" sz="2200" dirty="0" smtClean="0">
+                <a:solidFill>
+                  <a:srgbClr val="000000"/>
+                </a:solidFill>
+                <a:latin typeface="Monaco"/>
+                <a:cs typeface="Monaco"/>
+              </a:rPr>
+              <a:t>[-2:])</a:t>
+            </a:r>
+          </a:p>
+          <a:p>
+            <a:r>
+              <a:rPr lang="en-US" sz="2200" dirty="0">
+                <a:solidFill>
                   <a:schemeClr val="bg1">
                     <a:lumMod val="65000"/>
                   </a:schemeClr>
@@ -21772,8 +21508,17 @@
                 <a:latin typeface="Monaco"/>
                 <a:cs typeface="Monaco"/>
               </a:rPr>
-              <a:t>13</a:t>
-            </a:r>
+              <a:t>[11, 13]</a:t>
+            </a:r>
+            <a:endParaRPr lang="en-US" sz="2200" dirty="0">
+              <a:solidFill>
+                <a:schemeClr val="bg1">
+                  <a:lumMod val="65000"/>
+                </a:schemeClr>
+              </a:solidFill>
+              <a:latin typeface="Monaco"/>
+              <a:cs typeface="Monaco"/>
+            </a:endParaRPr>
           </a:p>
           <a:p>
             <a:endParaRPr lang="en-US" sz="2200" dirty="0">
@@ -21934,7 +21679,394 @@
   <p:timing>
     <p:tnLst>
       <p:par>
-        <p:cTn id="1" dur="indefinite" restart="never" nodeType="tmRoot"/>
+        <p:cTn id="1" dur="indefinite" restart="never" nodeType="tmRoot">
+          <p:childTnLst>
+            <p:seq concurrent="1" nextAc="seek">
+              <p:cTn id="2" dur="indefinite" nodeType="mainSeq">
+                <p:childTnLst>
+                  <p:par>
+                    <p:cTn id="3" fill="hold">
+                      <p:stCondLst>
+                        <p:cond delay="indefinite"/>
+                      </p:stCondLst>
+                      <p:childTnLst>
+                        <p:par>
+                          <p:cTn id="4" fill="hold">
+                            <p:stCondLst>
+                              <p:cond delay="0"/>
+                            </p:stCondLst>
+                            <p:childTnLst>
+                              <p:par>
+                                <p:cTn id="5" presetID="1" presetClass="entr" presetSubtype="0" fill="hold" nodeType="clickEffect">
+                                  <p:stCondLst>
+                                    <p:cond delay="0"/>
+                                  </p:stCondLst>
+                                  <p:childTnLst>
+                                    <p:set>
+                                      <p:cBhvr>
+                                        <p:cTn id="6" dur="1" fill="hold">
+                                          <p:stCondLst>
+                                            <p:cond delay="0"/>
+                                          </p:stCondLst>
+                                        </p:cTn>
+                                        <p:tgtEl>
+                                          <p:spTgt spid="4">
+                                            <p:txEl>
+                                              <p:pRg st="4" end="4"/>
+                                            </p:txEl>
+                                          </p:spTgt>
+                                        </p:tgtEl>
+                                        <p:attrNameLst>
+                                          <p:attrName>style.visibility</p:attrName>
+                                        </p:attrNameLst>
+                                      </p:cBhvr>
+                                      <p:to>
+                                        <p:strVal val="visible"/>
+                                      </p:to>
+                                    </p:set>
+                                  </p:childTnLst>
+                                </p:cTn>
+                              </p:par>
+                              <p:par>
+                                <p:cTn id="7" presetID="1" presetClass="entr" presetSubtype="0" fill="hold" nodeType="withEffect">
+                                  <p:stCondLst>
+                                    <p:cond delay="0"/>
+                                  </p:stCondLst>
+                                  <p:childTnLst>
+                                    <p:set>
+                                      <p:cBhvr>
+                                        <p:cTn id="8" dur="1" fill="hold">
+                                          <p:stCondLst>
+                                            <p:cond delay="0"/>
+                                          </p:stCondLst>
+                                        </p:cTn>
+                                        <p:tgtEl>
+                                          <p:spTgt spid="4">
+                                            <p:txEl>
+                                              <p:pRg st="5" end="5"/>
+                                            </p:txEl>
+                                          </p:spTgt>
+                                        </p:tgtEl>
+                                        <p:attrNameLst>
+                                          <p:attrName>style.visibility</p:attrName>
+                                        </p:attrNameLst>
+                                      </p:cBhvr>
+                                      <p:to>
+                                        <p:strVal val="visible"/>
+                                      </p:to>
+                                    </p:set>
+                                  </p:childTnLst>
+                                </p:cTn>
+                              </p:par>
+                              <p:par>
+                                <p:cTn id="9" presetID="1" presetClass="entr" presetSubtype="0" fill="hold" nodeType="withEffect">
+                                  <p:stCondLst>
+                                    <p:cond delay="0"/>
+                                  </p:stCondLst>
+                                  <p:childTnLst>
+                                    <p:set>
+                                      <p:cBhvr>
+                                        <p:cTn id="10" dur="1" fill="hold">
+                                          <p:stCondLst>
+                                            <p:cond delay="0"/>
+                                          </p:stCondLst>
+                                        </p:cTn>
+                                        <p:tgtEl>
+                                          <p:spTgt spid="4">
+                                            <p:txEl>
+                                              <p:pRg st="6" end="6"/>
+                                            </p:txEl>
+                                          </p:spTgt>
+                                        </p:tgtEl>
+                                        <p:attrNameLst>
+                                          <p:attrName>style.visibility</p:attrName>
+                                        </p:attrNameLst>
+                                      </p:cBhvr>
+                                      <p:to>
+                                        <p:strVal val="visible"/>
+                                      </p:to>
+                                    </p:set>
+                                  </p:childTnLst>
+                                </p:cTn>
+                              </p:par>
+                            </p:childTnLst>
+                          </p:cTn>
+                        </p:par>
+                      </p:childTnLst>
+                    </p:cTn>
+                  </p:par>
+                  <p:par>
+                    <p:cTn id="11" fill="hold">
+                      <p:stCondLst>
+                        <p:cond delay="indefinite"/>
+                      </p:stCondLst>
+                      <p:childTnLst>
+                        <p:par>
+                          <p:cTn id="12" fill="hold">
+                            <p:stCondLst>
+                              <p:cond delay="0"/>
+                            </p:stCondLst>
+                            <p:childTnLst>
+                              <p:par>
+                                <p:cTn id="13" presetID="1" presetClass="entr" presetSubtype="0" fill="hold" nodeType="clickEffect">
+                                  <p:stCondLst>
+                                    <p:cond delay="0"/>
+                                  </p:stCondLst>
+                                  <p:childTnLst>
+                                    <p:set>
+                                      <p:cBhvr>
+                                        <p:cTn id="14" dur="1" fill="hold">
+                                          <p:stCondLst>
+                                            <p:cond delay="0"/>
+                                          </p:stCondLst>
+                                        </p:cTn>
+                                        <p:tgtEl>
+                                          <p:spTgt spid="4">
+                                            <p:txEl>
+                                              <p:pRg st="8" end="8"/>
+                                            </p:txEl>
+                                          </p:spTgt>
+                                        </p:tgtEl>
+                                        <p:attrNameLst>
+                                          <p:attrName>style.visibility</p:attrName>
+                                        </p:attrNameLst>
+                                      </p:cBhvr>
+                                      <p:to>
+                                        <p:strVal val="visible"/>
+                                      </p:to>
+                                    </p:set>
+                                  </p:childTnLst>
+                                </p:cTn>
+                              </p:par>
+                              <p:par>
+                                <p:cTn id="15" presetID="1" presetClass="entr" presetSubtype="0" fill="hold" nodeType="withEffect">
+                                  <p:stCondLst>
+                                    <p:cond delay="0"/>
+                                  </p:stCondLst>
+                                  <p:childTnLst>
+                                    <p:set>
+                                      <p:cBhvr>
+                                        <p:cTn id="16" dur="1" fill="hold">
+                                          <p:stCondLst>
+                                            <p:cond delay="0"/>
+                                          </p:stCondLst>
+                                        </p:cTn>
+                                        <p:tgtEl>
+                                          <p:spTgt spid="4">
+                                            <p:txEl>
+                                              <p:pRg st="9" end="9"/>
+                                            </p:txEl>
+                                          </p:spTgt>
+                                        </p:tgtEl>
+                                        <p:attrNameLst>
+                                          <p:attrName>style.visibility</p:attrName>
+                                        </p:attrNameLst>
+                                      </p:cBhvr>
+                                      <p:to>
+                                        <p:strVal val="visible"/>
+                                      </p:to>
+                                    </p:set>
+                                  </p:childTnLst>
+                                </p:cTn>
+                              </p:par>
+                              <p:par>
+                                <p:cTn id="17" presetID="1" presetClass="entr" presetSubtype="0" fill="hold" nodeType="withEffect">
+                                  <p:stCondLst>
+                                    <p:cond delay="0"/>
+                                  </p:stCondLst>
+                                  <p:childTnLst>
+                                    <p:set>
+                                      <p:cBhvr>
+                                        <p:cTn id="18" dur="1" fill="hold">
+                                          <p:stCondLst>
+                                            <p:cond delay="0"/>
+                                          </p:stCondLst>
+                                        </p:cTn>
+                                        <p:tgtEl>
+                                          <p:spTgt spid="4">
+                                            <p:txEl>
+                                              <p:pRg st="10" end="10"/>
+                                            </p:txEl>
+                                          </p:spTgt>
+                                        </p:tgtEl>
+                                        <p:attrNameLst>
+                                          <p:attrName>style.visibility</p:attrName>
+                                        </p:attrNameLst>
+                                      </p:cBhvr>
+                                      <p:to>
+                                        <p:strVal val="visible"/>
+                                      </p:to>
+                                    </p:set>
+                                  </p:childTnLst>
+                                </p:cTn>
+                              </p:par>
+                            </p:childTnLst>
+                          </p:cTn>
+                        </p:par>
+                      </p:childTnLst>
+                    </p:cTn>
+                  </p:par>
+                  <p:par>
+                    <p:cTn id="19" fill="hold">
+                      <p:stCondLst>
+                        <p:cond delay="indefinite"/>
+                      </p:stCondLst>
+                      <p:childTnLst>
+                        <p:par>
+                          <p:cTn id="20" fill="hold">
+                            <p:stCondLst>
+                              <p:cond delay="0"/>
+                            </p:stCondLst>
+                            <p:childTnLst>
+                              <p:par>
+                                <p:cTn id="21" presetID="1" presetClass="entr" presetSubtype="0" fill="hold" nodeType="clickEffect">
+                                  <p:stCondLst>
+                                    <p:cond delay="0"/>
+                                  </p:stCondLst>
+                                  <p:childTnLst>
+                                    <p:set>
+                                      <p:cBhvr>
+                                        <p:cTn id="22" dur="1" fill="hold">
+                                          <p:stCondLst>
+                                            <p:cond delay="0"/>
+                                          </p:stCondLst>
+                                        </p:cTn>
+                                        <p:tgtEl>
+                                          <p:spTgt spid="4">
+                                            <p:txEl>
+                                              <p:pRg st="12" end="12"/>
+                                            </p:txEl>
+                                          </p:spTgt>
+                                        </p:tgtEl>
+                                        <p:attrNameLst>
+                                          <p:attrName>style.visibility</p:attrName>
+                                        </p:attrNameLst>
+                                      </p:cBhvr>
+                                      <p:to>
+                                        <p:strVal val="visible"/>
+                                      </p:to>
+                                    </p:set>
+                                  </p:childTnLst>
+                                </p:cTn>
+                              </p:par>
+                              <p:par>
+                                <p:cTn id="23" presetID="1" presetClass="entr" presetSubtype="0" fill="hold" nodeType="withEffect">
+                                  <p:stCondLst>
+                                    <p:cond delay="0"/>
+                                  </p:stCondLst>
+                                  <p:childTnLst>
+                                    <p:set>
+                                      <p:cBhvr>
+                                        <p:cTn id="24" dur="1" fill="hold">
+                                          <p:stCondLst>
+                                            <p:cond delay="0"/>
+                                          </p:stCondLst>
+                                        </p:cTn>
+                                        <p:tgtEl>
+                                          <p:spTgt spid="4">
+                                            <p:txEl>
+                                              <p:pRg st="13" end="13"/>
+                                            </p:txEl>
+                                          </p:spTgt>
+                                        </p:tgtEl>
+                                        <p:attrNameLst>
+                                          <p:attrName>style.visibility</p:attrName>
+                                        </p:attrNameLst>
+                                      </p:cBhvr>
+                                      <p:to>
+                                        <p:strVal val="visible"/>
+                                      </p:to>
+                                    </p:set>
+                                  </p:childTnLst>
+                                </p:cTn>
+                              </p:par>
+                              <p:par>
+                                <p:cTn id="25" presetID="1" presetClass="entr" presetSubtype="0" fill="hold" nodeType="withEffect">
+                                  <p:stCondLst>
+                                    <p:cond delay="0"/>
+                                  </p:stCondLst>
+                                  <p:childTnLst>
+                                    <p:set>
+                                      <p:cBhvr>
+                                        <p:cTn id="26" dur="1" fill="hold">
+                                          <p:stCondLst>
+                                            <p:cond delay="0"/>
+                                          </p:stCondLst>
+                                        </p:cTn>
+                                        <p:tgtEl>
+                                          <p:spTgt spid="4">
+                                            <p:txEl>
+                                              <p:pRg st="14" end="14"/>
+                                            </p:txEl>
+                                          </p:spTgt>
+                                        </p:tgtEl>
+                                        <p:attrNameLst>
+                                          <p:attrName>style.visibility</p:attrName>
+                                        </p:attrNameLst>
+                                      </p:cBhvr>
+                                      <p:to>
+                                        <p:strVal val="visible"/>
+                                      </p:to>
+                                    </p:set>
+                                  </p:childTnLst>
+                                </p:cTn>
+                              </p:par>
+                              <p:par>
+                                <p:cTn id="27" presetID="1" presetClass="entr" presetSubtype="0" fill="hold" nodeType="withEffect">
+                                  <p:stCondLst>
+                                    <p:cond delay="0"/>
+                                  </p:stCondLst>
+                                  <p:childTnLst>
+                                    <p:set>
+                                      <p:cBhvr>
+                                        <p:cTn id="28" dur="1" fill="hold">
+                                          <p:stCondLst>
+                                            <p:cond delay="0"/>
+                                          </p:stCondLst>
+                                        </p:cTn>
+                                        <p:tgtEl>
+                                          <p:spTgt spid="4">
+                                            <p:txEl>
+                                              <p:pRg st="15" end="15"/>
+                                            </p:txEl>
+                                          </p:spTgt>
+                                        </p:tgtEl>
+                                        <p:attrNameLst>
+                                          <p:attrName>style.visibility</p:attrName>
+                                        </p:attrNameLst>
+                                      </p:cBhvr>
+                                      <p:to>
+                                        <p:strVal val="visible"/>
+                                      </p:to>
+                                    </p:set>
+                                  </p:childTnLst>
+                                </p:cTn>
+                              </p:par>
+                            </p:childTnLst>
+                          </p:cTn>
+                        </p:par>
+                      </p:childTnLst>
+                    </p:cTn>
+                  </p:par>
+                </p:childTnLst>
+              </p:cTn>
+              <p:prevCondLst>
+                <p:cond evt="onPrev" delay="0">
+                  <p:tgtEl>
+                    <p:sldTgt/>
+                  </p:tgtEl>
+                </p:cond>
+              </p:prevCondLst>
+              <p:nextCondLst>
+                <p:cond evt="onNext" delay="0">
+                  <p:tgtEl>
+                    <p:sldTgt/>
+                  </p:tgtEl>
+                </p:cond>
+              </p:nextCondLst>
+            </p:seq>
+          </p:childTnLst>
+        </p:cTn>
       </p:par>
     </p:tnLst>
   </p:timing>
@@ -23137,20 +23269,7 @@
                 <a:latin typeface="Monaco"/>
                 <a:cs typeface="Monaco"/>
               </a:rPr>
-              <a:t># </a:t>
-            </a:r>
-            <a:r>
-              <a:rPr lang="en-US" sz="2000" dirty="0" smtClean="0">
-                <a:solidFill>
-                  <a:schemeClr val="accent3">
-                    <a:lumMod val="60000"/>
-                    <a:lumOff val="40000"/>
-                  </a:schemeClr>
-                </a:solidFill>
-                <a:latin typeface="Monaco"/>
-                <a:cs typeface="Monaco"/>
-              </a:rPr>
-              <a:t>Instead</a:t>
+              <a:t># Instead</a:t>
             </a:r>
             <a:r>
               <a:rPr lang="en-US" sz="2000" dirty="0">
@@ -24004,7 +24123,15 @@
           <a:p>
             <a:r>
               <a:rPr lang="en-US" dirty="0" smtClean="0"/>
-              <a:t>Lets see this in action</a:t>
+              <a:t>in</a:t>
+            </a:r>
+            <a:r>
+              <a:rPr lang="mr-IN" dirty="0" smtClean="0"/>
+              <a:t>…</a:t>
+            </a:r>
+            <a:r>
+              <a:rPr lang="en-US" dirty="0" smtClean="0"/>
+              <a:t> in action</a:t>
             </a:r>
             <a:endParaRPr lang="en-US" dirty="0"/>
           </a:p>
@@ -24062,7 +24189,7 @@
               <a:t>if 10 </a:t>
             </a:r>
             <a:r>
-              <a:rPr lang="en-US" sz="2000" dirty="0" smtClean="0">
+              <a:rPr lang="en-US" sz="2000" b="1" dirty="0" smtClean="0">
                 <a:solidFill>
                   <a:schemeClr val="accent5"/>
                 </a:solidFill>
@@ -24353,6 +24480,13 @@
   <p:clrMapOvr>
     <a:masterClrMapping/>
   </p:clrMapOvr>
+  <p:timing>
+    <p:tnLst>
+      <p:par>
+        <p:cTn id="1" dur="indefinite" restart="never" nodeType="tmRoot"/>
+      </p:par>
+    </p:tnLst>
+  </p:timing>
 </p:sld>
 </file>
 

</xml_diff>